<commit_message>
Begin to flesh out readme, add a few configuration slides to the powerpoint, add guide.md outline, add new screenshot of our DNS configuration
</commit_message>
<xml_diff>
--- a/everyone-can-be-root.pptx
+++ b/everyone-can-be-root.pptx
@@ -18,18 +18,24 @@
     <p:sldId id="263" r:id="rId13"/>
     <p:sldId id="264" r:id="rId14"/>
     <p:sldId id="265" r:id="rId15"/>
+    <p:sldId id="266" r:id="rId16"/>
+    <p:sldId id="267" r:id="rId17"/>
+    <p:sldId id="268" r:id="rId18"/>
+    <p:sldId id="269" r:id="rId19"/>
+    <p:sldId id="270" r:id="rId20"/>
+    <p:sldId id="271" r:id="rId21"/>
   </p:sldIdLst>
   <p:sldSz cy="5143500" cx="9144000"/>
   <p:notesSz cx="6858000" cy="9144000"/>
   <p:embeddedFontLst>
     <p:embeddedFont>
       <p:font typeface="Average"/>
-      <p:regular r:id="rId16"/>
+      <p:regular r:id="rId22"/>
     </p:embeddedFont>
     <p:embeddedFont>
       <p:font typeface="Oswald"/>
-      <p:regular r:id="rId17"/>
-      <p:bold r:id="rId18"/>
+      <p:regular r:id="rId23"/>
+      <p:bold r:id="rId24"/>
     </p:embeddedFont>
   </p:embeddedFontLst>
   <p:defaultTextStyle>
@@ -810,7 +816,7 @@
   <p:cSld>
     <p:spTree>
       <p:nvGrpSpPr>
-        <p:cNvPr id="102" name="Shape 102"/>
+        <p:cNvPr id="109" name="Shape 109"/>
         <p:cNvGrpSpPr/>
         <p:nvPr/>
       </p:nvGrpSpPr>
@@ -824,7 +830,7 @@
       </p:grpSpPr>
       <p:sp>
         <p:nvSpPr>
-          <p:cNvPr id="103" name="Google Shape;103;g5de3adfb2a_0_16:notes"/>
+          <p:cNvPr id="110" name="Google Shape;110;g5de3adfb2a_0_0:notes"/>
           <p:cNvSpPr/>
           <p:nvPr>
             <p:ph idx="2" type="sldImg"/>
@@ -859,7 +865,797 @@
       </p:sp>
       <p:sp>
         <p:nvSpPr>
-          <p:cNvPr id="104" name="Google Shape;104;g5de3adfb2a_0_16:notes"/>
+          <p:cNvPr id="111" name="Google Shape;111;g5de3adfb2a_0_0:notes"/>
+          <p:cNvSpPr txBox="1"/>
+          <p:nvPr>
+            <p:ph idx="1" type="body"/>
+          </p:nvPr>
+        </p:nvSpPr>
+        <p:spPr>
+          <a:xfrm>
+            <a:off x="685800" y="4343400"/>
+            <a:ext cx="5486400" cy="4114800"/>
+          </a:xfrm>
+          <a:prstGeom prst="rect">
+            <a:avLst/>
+          </a:prstGeom>
+        </p:spPr>
+        <p:txBody>
+          <a:bodyPr anchorCtr="0" anchor="t" bIns="91425" lIns="91425" spcFirstLastPara="1" rIns="91425" wrap="square" tIns="91425">
+            <a:noAutofit/>
+          </a:bodyPr>
+          <a:lstStyle/>
+          <a:p>
+            <a:pPr indent="0" lvl="0" marL="0" rtl="0" algn="l">
+              <a:spcBef>
+                <a:spcPts val="0"/>
+              </a:spcBef>
+              <a:spcAft>
+                <a:spcPts val="0"/>
+              </a:spcAft>
+              <a:buNone/>
+            </a:pPr>
+            <a:r>
+              <a:rPr lang="en"/>
+              <a:t>What is Linux Club?</a:t>
+            </a:r>
+            <a:endParaRPr/>
+          </a:p>
+          <a:p>
+            <a:pPr indent="0" lvl="0" marL="0" rtl="0" algn="l">
+              <a:spcBef>
+                <a:spcPts val="0"/>
+              </a:spcBef>
+              <a:spcAft>
+                <a:spcPts val="0"/>
+              </a:spcAft>
+              <a:buNone/>
+            </a:pPr>
+            <a:r>
+              <a:rPr lang="en"/>
+              <a:t>It’s a group where a bunch of nerds get to hang out together</a:t>
+            </a:r>
+            <a:endParaRPr/>
+          </a:p>
+          <a:p>
+            <a:pPr indent="0" lvl="0" marL="0" rtl="0" algn="l">
+              <a:spcBef>
+                <a:spcPts val="0"/>
+              </a:spcBef>
+              <a:spcAft>
+                <a:spcPts val="0"/>
+              </a:spcAft>
+              <a:buNone/>
+            </a:pPr>
+            <a:r>
+              <a:rPr lang="en"/>
+              <a:t>Anecdote - when I started using linux, I didn’t know other people who were cool</a:t>
+            </a:r>
+            <a:endParaRPr/>
+          </a:p>
+          <a:p>
+            <a:pPr indent="0" lvl="0" marL="0" rtl="0" algn="l">
+              <a:spcBef>
+                <a:spcPts val="0"/>
+              </a:spcBef>
+              <a:spcAft>
+                <a:spcPts val="0"/>
+              </a:spcAft>
+              <a:buNone/>
+            </a:pPr>
+            <a:r>
+              <a:rPr lang="en"/>
+              <a:t>Membership / who shows up / improvements?</a:t>
+            </a:r>
+            <a:endParaRPr/>
+          </a:p>
+          <a:p>
+            <a:pPr indent="0" lvl="0" marL="0" rtl="0" algn="l">
+              <a:spcBef>
+                <a:spcPts val="0"/>
+              </a:spcBef>
+              <a:spcAft>
+                <a:spcPts val="0"/>
+              </a:spcAft>
+              <a:buNone/>
+            </a:pPr>
+            <a:r>
+              <a:rPr lang="en"/>
+              <a:t>Why is it important- two reasons- segue-</a:t>
+            </a:r>
+            <a:endParaRPr/>
+          </a:p>
+        </p:txBody>
+      </p:sp>
+    </p:spTree>
+  </p:cSld>
+  <p:clrMapOvr>
+    <a:masterClrMapping/>
+  </p:clrMapOvr>
+</p:notes>
+</file>
+
+<file path=ppt/notesSlides/notesSlide11.xml><?xml version="1.0" encoding="utf-8"?>
+<p:notes xmlns:a="http://schemas.openxmlformats.org/drawingml/2006/main" xmlns:r="http://schemas.openxmlformats.org/officeDocument/2006/relationships" xmlns:mc="http://schemas.openxmlformats.org/markup-compatibility/2006" xmlns:mv="urn:schemas-microsoft-com:mac:vml" xmlns:p="http://schemas.openxmlformats.org/presentationml/2006/main" xmlns:c="http://schemas.openxmlformats.org/drawingml/2006/chart" xmlns:dgm="http://schemas.openxmlformats.org/drawingml/2006/diagram" xmlns:o="urn:schemas-microsoft-com:office:office" xmlns:v="urn:schemas-microsoft-com:vml" xmlns:pvml="urn:schemas-microsoft-com:office:powerpoint" xmlns:com="http://schemas.openxmlformats.org/drawingml/2006/compatibility" xmlns:p14="http://schemas.microsoft.com/office/powerpoint/2010/main" xmlns:p15="http://schemas.microsoft.com/office/powerpoint/2012/main" showMasterPhAnim="0" showMasterSp="0">
+  <p:cSld>
+    <p:spTree>
+      <p:nvGrpSpPr>
+        <p:cNvPr id="114" name="Shape 114"/>
+        <p:cNvGrpSpPr/>
+        <p:nvPr/>
+      </p:nvGrpSpPr>
+      <p:grpSpPr>
+        <a:xfrm>
+          <a:off x="0" y="0"/>
+          <a:ext cx="0" cy="0"/>
+          <a:chOff x="0" y="0"/>
+          <a:chExt cx="0" cy="0"/>
+        </a:xfrm>
+      </p:grpSpPr>
+      <p:sp>
+        <p:nvSpPr>
+          <p:cNvPr id="115" name="Google Shape;115;g5de3adfb2a_0_4:notes"/>
+          <p:cNvSpPr/>
+          <p:nvPr>
+            <p:ph idx="2" type="sldImg"/>
+          </p:nvPr>
+        </p:nvSpPr>
+        <p:spPr>
+          <a:xfrm>
+            <a:off x="381300" y="685800"/>
+            <a:ext cx="6096000" cy="3429000"/>
+          </a:xfrm>
+          <a:custGeom>
+            <a:rect b="b" l="l" r="r" t="t"/>
+            <a:pathLst>
+              <a:path extrusionOk="0" h="120000" w="120000">
+                <a:moveTo>
+                  <a:pt x="0" y="0"/>
+                </a:moveTo>
+                <a:lnTo>
+                  <a:pt x="120000" y="0"/>
+                </a:lnTo>
+                <a:lnTo>
+                  <a:pt x="120000" y="120000"/>
+                </a:lnTo>
+                <a:lnTo>
+                  <a:pt x="0" y="120000"/>
+                </a:lnTo>
+                <a:close/>
+              </a:path>
+            </a:pathLst>
+          </a:custGeom>
+        </p:spPr>
+      </p:sp>
+      <p:sp>
+        <p:nvSpPr>
+          <p:cNvPr id="116" name="Google Shape;116;g5de3adfb2a_0_4:notes"/>
+          <p:cNvSpPr txBox="1"/>
+          <p:nvPr>
+            <p:ph idx="1" type="body"/>
+          </p:nvPr>
+        </p:nvSpPr>
+        <p:spPr>
+          <a:xfrm>
+            <a:off x="685800" y="4343400"/>
+            <a:ext cx="5486400" cy="4114800"/>
+          </a:xfrm>
+          <a:prstGeom prst="rect">
+            <a:avLst/>
+          </a:prstGeom>
+        </p:spPr>
+        <p:txBody>
+          <a:bodyPr anchorCtr="0" anchor="t" bIns="91425" lIns="91425" spcFirstLastPara="1" rIns="91425" wrap="square" tIns="91425">
+            <a:noAutofit/>
+          </a:bodyPr>
+          <a:lstStyle/>
+          <a:p>
+            <a:pPr indent="0" lvl="0" marL="0" rtl="0" algn="l">
+              <a:spcBef>
+                <a:spcPts val="0"/>
+              </a:spcBef>
+              <a:spcAft>
+                <a:spcPts val="0"/>
+              </a:spcAft>
+              <a:buNone/>
+            </a:pPr>
+            <a:r>
+              <a:rPr lang="en"/>
+              <a:t>fostering a CS community (which can be rare) and engaging programmers in social activities</a:t>
+            </a:r>
+            <a:endParaRPr/>
+          </a:p>
+          <a:p>
+            <a:pPr indent="0" lvl="0" marL="0" rtl="0" algn="l">
+              <a:spcBef>
+                <a:spcPts val="0"/>
+              </a:spcBef>
+              <a:spcAft>
+                <a:spcPts val="0"/>
+              </a:spcAft>
+              <a:buNone/>
+            </a:pPr>
+            <a:r>
+              <a:rPr lang="en"/>
+              <a:t>Other majors / aspects of study tend to build communities and relationships, but programmers tend to be a bit a-social</a:t>
+            </a:r>
+            <a:endParaRPr/>
+          </a:p>
+          <a:p>
+            <a:pPr indent="0" lvl="0" marL="0" rtl="0" algn="l">
+              <a:spcBef>
+                <a:spcPts val="0"/>
+              </a:spcBef>
+              <a:spcAft>
+                <a:spcPts val="0"/>
+              </a:spcAft>
+              <a:buNone/>
+            </a:pPr>
+            <a:r>
+              <a:rPr lang="en"/>
+              <a:t>Creating connections is very important - also important is - </a:t>
+            </a:r>
+            <a:endParaRPr/>
+          </a:p>
+        </p:txBody>
+      </p:sp>
+    </p:spTree>
+  </p:cSld>
+  <p:clrMapOvr>
+    <a:masterClrMapping/>
+  </p:clrMapOvr>
+</p:notes>
+</file>
+
+<file path=ppt/notesSlides/notesSlide12.xml><?xml version="1.0" encoding="utf-8"?>
+<p:notes xmlns:a="http://schemas.openxmlformats.org/drawingml/2006/main" xmlns:r="http://schemas.openxmlformats.org/officeDocument/2006/relationships" xmlns:mc="http://schemas.openxmlformats.org/markup-compatibility/2006" xmlns:mv="urn:schemas-microsoft-com:mac:vml" xmlns:p="http://schemas.openxmlformats.org/presentationml/2006/main" xmlns:c="http://schemas.openxmlformats.org/drawingml/2006/chart" xmlns:dgm="http://schemas.openxmlformats.org/drawingml/2006/diagram" xmlns:o="urn:schemas-microsoft-com:office:office" xmlns:v="urn:schemas-microsoft-com:vml" xmlns:pvml="urn:schemas-microsoft-com:office:powerpoint" xmlns:com="http://schemas.openxmlformats.org/drawingml/2006/compatibility" xmlns:p14="http://schemas.microsoft.com/office/powerpoint/2010/main" xmlns:p15="http://schemas.microsoft.com/office/powerpoint/2012/main" showMasterPhAnim="0" showMasterSp="0">
+  <p:cSld>
+    <p:spTree>
+      <p:nvGrpSpPr>
+        <p:cNvPr id="119" name="Shape 119"/>
+        <p:cNvGrpSpPr/>
+        <p:nvPr/>
+      </p:nvGrpSpPr>
+      <p:grpSpPr>
+        <a:xfrm>
+          <a:off x="0" y="0"/>
+          <a:ext cx="0" cy="0"/>
+          <a:chOff x="0" y="0"/>
+          <a:chExt cx="0" cy="0"/>
+        </a:xfrm>
+      </p:grpSpPr>
+      <p:sp>
+        <p:nvSpPr>
+          <p:cNvPr id="120" name="Google Shape;120;g5de3adfb2a_0_8:notes"/>
+          <p:cNvSpPr/>
+          <p:nvPr>
+            <p:ph idx="2" type="sldImg"/>
+          </p:nvPr>
+        </p:nvSpPr>
+        <p:spPr>
+          <a:xfrm>
+            <a:off x="381300" y="685800"/>
+            <a:ext cx="6096000" cy="3429000"/>
+          </a:xfrm>
+          <a:custGeom>
+            <a:rect b="b" l="l" r="r" t="t"/>
+            <a:pathLst>
+              <a:path extrusionOk="0" h="120000" w="120000">
+                <a:moveTo>
+                  <a:pt x="0" y="0"/>
+                </a:moveTo>
+                <a:lnTo>
+                  <a:pt x="120000" y="0"/>
+                </a:lnTo>
+                <a:lnTo>
+                  <a:pt x="120000" y="120000"/>
+                </a:lnTo>
+                <a:lnTo>
+                  <a:pt x="0" y="120000"/>
+                </a:lnTo>
+                <a:close/>
+              </a:path>
+            </a:pathLst>
+          </a:custGeom>
+        </p:spPr>
+      </p:sp>
+      <p:sp>
+        <p:nvSpPr>
+          <p:cNvPr id="121" name="Google Shape;121;g5de3adfb2a_0_8:notes"/>
+          <p:cNvSpPr txBox="1"/>
+          <p:nvPr>
+            <p:ph idx="1" type="body"/>
+          </p:nvPr>
+        </p:nvSpPr>
+        <p:spPr>
+          <a:xfrm>
+            <a:off x="685800" y="4343400"/>
+            <a:ext cx="5486400" cy="4114800"/>
+          </a:xfrm>
+          <a:prstGeom prst="rect">
+            <a:avLst/>
+          </a:prstGeom>
+        </p:spPr>
+        <p:txBody>
+          <a:bodyPr anchorCtr="0" anchor="t" bIns="91425" lIns="91425" spcFirstLastPara="1" rIns="91425" wrap="square" tIns="91425">
+            <a:noAutofit/>
+          </a:bodyPr>
+          <a:lstStyle/>
+          <a:p>
+            <a:pPr indent="0" lvl="0" marL="0" rtl="0" algn="l">
+              <a:spcBef>
+                <a:spcPts val="0"/>
+              </a:spcBef>
+              <a:spcAft>
+                <a:spcPts val="0"/>
+              </a:spcAft>
+              <a:buNone/>
+            </a:pPr>
+            <a:r>
+              <a:rPr lang="en"/>
+              <a:t>Some people take to linux easily, some need a hand</a:t>
+            </a:r>
+            <a:endParaRPr/>
+          </a:p>
+          <a:p>
+            <a:pPr indent="0" lvl="0" marL="0" rtl="0" algn="l">
+              <a:spcBef>
+                <a:spcPts val="0"/>
+              </a:spcBef>
+              <a:spcAft>
+                <a:spcPts val="0"/>
+              </a:spcAft>
+              <a:buNone/>
+            </a:pPr>
+            <a:r>
+              <a:rPr lang="en"/>
+              <a:t>Teaching people about why linux is cool can get them interested / ahead of the game in industry techniques</a:t>
+            </a:r>
+            <a:endParaRPr/>
+          </a:p>
+          <a:p>
+            <a:pPr indent="0" lvl="0" marL="0" rtl="0" algn="l">
+              <a:spcBef>
+                <a:spcPts val="0"/>
+              </a:spcBef>
+              <a:spcAft>
+                <a:spcPts val="0"/>
+              </a:spcAft>
+              <a:buNone/>
+            </a:pPr>
+            <a:r>
+              <a:rPr lang="en"/>
+              <a:t>I got my job almost primarily off of linux experience, these are valuable skills that can be difficult to learn without introduction- making linux less scary</a:t>
+            </a:r>
+            <a:endParaRPr/>
+          </a:p>
+        </p:txBody>
+      </p:sp>
+    </p:spTree>
+  </p:cSld>
+  <p:clrMapOvr>
+    <a:masterClrMapping/>
+  </p:clrMapOvr>
+</p:notes>
+</file>
+
+<file path=ppt/notesSlides/notesSlide13.xml><?xml version="1.0" encoding="utf-8"?>
+<p:notes xmlns:a="http://schemas.openxmlformats.org/drawingml/2006/main" xmlns:r="http://schemas.openxmlformats.org/officeDocument/2006/relationships" xmlns:mc="http://schemas.openxmlformats.org/markup-compatibility/2006" xmlns:mv="urn:schemas-microsoft-com:mac:vml" xmlns:p="http://schemas.openxmlformats.org/presentationml/2006/main" xmlns:c="http://schemas.openxmlformats.org/drawingml/2006/chart" xmlns:dgm="http://schemas.openxmlformats.org/drawingml/2006/diagram" xmlns:o="urn:schemas-microsoft-com:office:office" xmlns:v="urn:schemas-microsoft-com:vml" xmlns:pvml="urn:schemas-microsoft-com:office:powerpoint" xmlns:com="http://schemas.openxmlformats.org/drawingml/2006/compatibility" xmlns:p14="http://schemas.microsoft.com/office/powerpoint/2010/main" xmlns:p15="http://schemas.microsoft.com/office/powerpoint/2012/main" showMasterPhAnim="0" showMasterSp="0">
+  <p:cSld>
+    <p:spTree>
+      <p:nvGrpSpPr>
+        <p:cNvPr id="124" name="Shape 124"/>
+        <p:cNvGrpSpPr/>
+        <p:nvPr/>
+      </p:nvGrpSpPr>
+      <p:grpSpPr>
+        <a:xfrm>
+          <a:off x="0" y="0"/>
+          <a:ext cx="0" cy="0"/>
+          <a:chOff x="0" y="0"/>
+          <a:chExt cx="0" cy="0"/>
+        </a:xfrm>
+      </p:grpSpPr>
+      <p:sp>
+        <p:nvSpPr>
+          <p:cNvPr id="125" name="Google Shape;125;g5de3adfb2a_0_12:notes"/>
+          <p:cNvSpPr/>
+          <p:nvPr>
+            <p:ph idx="2" type="sldImg"/>
+          </p:nvPr>
+        </p:nvSpPr>
+        <p:spPr>
+          <a:xfrm>
+            <a:off x="381300" y="685800"/>
+            <a:ext cx="6096000" cy="3429000"/>
+          </a:xfrm>
+          <a:custGeom>
+            <a:rect b="b" l="l" r="r" t="t"/>
+            <a:pathLst>
+              <a:path extrusionOk="0" h="120000" w="120000">
+                <a:moveTo>
+                  <a:pt x="0" y="0"/>
+                </a:moveTo>
+                <a:lnTo>
+                  <a:pt x="120000" y="0"/>
+                </a:lnTo>
+                <a:lnTo>
+                  <a:pt x="120000" y="120000"/>
+                </a:lnTo>
+                <a:lnTo>
+                  <a:pt x="0" y="120000"/>
+                </a:lnTo>
+                <a:close/>
+              </a:path>
+            </a:pathLst>
+          </a:custGeom>
+        </p:spPr>
+      </p:sp>
+      <p:sp>
+        <p:nvSpPr>
+          <p:cNvPr id="126" name="Google Shape;126;g5de3adfb2a_0_12:notes"/>
+          <p:cNvSpPr txBox="1"/>
+          <p:nvPr>
+            <p:ph idx="1" type="body"/>
+          </p:nvPr>
+        </p:nvSpPr>
+        <p:spPr>
+          <a:xfrm>
+            <a:off x="685800" y="4343400"/>
+            <a:ext cx="5486400" cy="4114800"/>
+          </a:xfrm>
+          <a:prstGeom prst="rect">
+            <a:avLst/>
+          </a:prstGeom>
+        </p:spPr>
+        <p:txBody>
+          <a:bodyPr anchorCtr="0" anchor="t" bIns="91425" lIns="91425" spcFirstLastPara="1" rIns="91425" wrap="square" tIns="91425">
+            <a:noAutofit/>
+          </a:bodyPr>
+          <a:lstStyle/>
+          <a:p>
+            <a:pPr indent="0" lvl="0" marL="0" rtl="0" algn="l">
+              <a:spcBef>
+                <a:spcPts val="0"/>
+              </a:spcBef>
+              <a:spcAft>
+                <a:spcPts val="0"/>
+              </a:spcAft>
+              <a:buNone/>
+            </a:pPr>
+            <a:r>
+              <a:rPr lang="en"/>
+              <a:t>How do we run the club? We talk about anything that interests us in linux. Usually start with introductory / beginner stuff, progress to more advanced presentations</a:t>
+            </a:r>
+            <a:endParaRPr/>
+          </a:p>
+          <a:p>
+            <a:pPr indent="0" lvl="0" marL="0" rtl="0" algn="l">
+              <a:spcBef>
+                <a:spcPts val="0"/>
+              </a:spcBef>
+              <a:spcAft>
+                <a:spcPts val="0"/>
+              </a:spcAft>
+              <a:buNone/>
+            </a:pPr>
+            <a:r>
+              <a:rPr lang="en"/>
+              <a:t>Community involvement is important here- taking time to have discussion about technical topics, or having community members give presentations about what interests them</a:t>
+            </a:r>
+            <a:endParaRPr/>
+          </a:p>
+        </p:txBody>
+      </p:sp>
+    </p:spTree>
+  </p:cSld>
+  <p:clrMapOvr>
+    <a:masterClrMapping/>
+  </p:clrMapOvr>
+</p:notes>
+</file>
+
+<file path=ppt/notesSlides/notesSlide14.xml><?xml version="1.0" encoding="utf-8"?>
+<p:notes xmlns:a="http://schemas.openxmlformats.org/drawingml/2006/main" xmlns:r="http://schemas.openxmlformats.org/officeDocument/2006/relationships" xmlns:mc="http://schemas.openxmlformats.org/markup-compatibility/2006" xmlns:mv="urn:schemas-microsoft-com:mac:vml" xmlns:p="http://schemas.openxmlformats.org/presentationml/2006/main" xmlns:c="http://schemas.openxmlformats.org/drawingml/2006/chart" xmlns:dgm="http://schemas.openxmlformats.org/drawingml/2006/diagram" xmlns:o="urn:schemas-microsoft-com:office:office" xmlns:v="urn:schemas-microsoft-com:vml" xmlns:pvml="urn:schemas-microsoft-com:office:powerpoint" xmlns:com="http://schemas.openxmlformats.org/drawingml/2006/compatibility" xmlns:p14="http://schemas.microsoft.com/office/powerpoint/2010/main" xmlns:p15="http://schemas.microsoft.com/office/powerpoint/2012/main" showMasterPhAnim="0" showMasterSp="0">
+  <p:cSld>
+    <p:spTree>
+      <p:nvGrpSpPr>
+        <p:cNvPr id="129" name="Shape 129"/>
+        <p:cNvGrpSpPr/>
+        <p:nvPr/>
+      </p:nvGrpSpPr>
+      <p:grpSpPr>
+        <a:xfrm>
+          <a:off x="0" y="0"/>
+          <a:ext cx="0" cy="0"/>
+          <a:chOff x="0" y="0"/>
+          <a:chExt cx="0" cy="0"/>
+        </a:xfrm>
+      </p:grpSpPr>
+      <p:sp>
+        <p:nvSpPr>
+          <p:cNvPr id="130" name="Google Shape;130;g5de3adfb2a_0_24:notes"/>
+          <p:cNvSpPr/>
+          <p:nvPr>
+            <p:ph idx="2" type="sldImg"/>
+          </p:nvPr>
+        </p:nvSpPr>
+        <p:spPr>
+          <a:xfrm>
+            <a:off x="381300" y="685800"/>
+            <a:ext cx="6096000" cy="3429000"/>
+          </a:xfrm>
+          <a:custGeom>
+            <a:rect b="b" l="l" r="r" t="t"/>
+            <a:pathLst>
+              <a:path extrusionOk="0" h="120000" w="120000">
+                <a:moveTo>
+                  <a:pt x="0" y="0"/>
+                </a:moveTo>
+                <a:lnTo>
+                  <a:pt x="120000" y="0"/>
+                </a:lnTo>
+                <a:lnTo>
+                  <a:pt x="120000" y="120000"/>
+                </a:lnTo>
+                <a:lnTo>
+                  <a:pt x="0" y="120000"/>
+                </a:lnTo>
+                <a:close/>
+              </a:path>
+            </a:pathLst>
+          </a:custGeom>
+        </p:spPr>
+      </p:sp>
+      <p:sp>
+        <p:nvSpPr>
+          <p:cNvPr id="131" name="Google Shape;131;g5de3adfb2a_0_24:notes"/>
+          <p:cNvSpPr txBox="1"/>
+          <p:nvPr>
+            <p:ph idx="1" type="body"/>
+          </p:nvPr>
+        </p:nvSpPr>
+        <p:spPr>
+          <a:xfrm>
+            <a:off x="685800" y="4343400"/>
+            <a:ext cx="5486400" cy="4114800"/>
+          </a:xfrm>
+          <a:prstGeom prst="rect">
+            <a:avLst/>
+          </a:prstGeom>
+        </p:spPr>
+        <p:txBody>
+          <a:bodyPr anchorCtr="0" anchor="t" bIns="91425" lIns="91425" spcFirstLastPara="1" rIns="91425" wrap="square" tIns="91425">
+            <a:noAutofit/>
+          </a:bodyPr>
+          <a:lstStyle/>
+          <a:p>
+            <a:pPr indent="0" lvl="0" marL="0" rtl="0" algn="l">
+              <a:spcBef>
+                <a:spcPts val="0"/>
+              </a:spcBef>
+              <a:spcAft>
+                <a:spcPts val="0"/>
+              </a:spcAft>
+              <a:buNone/>
+            </a:pPr>
+            <a:r>
+              <a:rPr lang="en"/>
+              <a:t>Linux club sounds cool, and it’s definitely something you can pull off, but there’s also work that you need to put in to get the ball rolling.</a:t>
+            </a:r>
+            <a:endParaRPr/>
+          </a:p>
+          <a:p>
+            <a:pPr indent="0" lvl="0" marL="0" rtl="0" algn="l">
+              <a:spcBef>
+                <a:spcPts val="0"/>
+              </a:spcBef>
+              <a:spcAft>
+                <a:spcPts val="0"/>
+              </a:spcAft>
+              <a:buNone/>
+            </a:pPr>
+            <a:r>
+              <a:rPr lang="en"/>
+              <a:t>Here are some of the issues we ran into, and how we’ve overcome them.</a:t>
+            </a:r>
+            <a:endParaRPr/>
+          </a:p>
+          <a:p>
+            <a:pPr indent="0" lvl="0" marL="0" rtl="0" algn="l">
+              <a:spcBef>
+                <a:spcPts val="0"/>
+              </a:spcBef>
+              <a:spcAft>
+                <a:spcPts val="0"/>
+              </a:spcAft>
+              <a:buNone/>
+            </a:pPr>
+            <a:r>
+              <a:t/>
+            </a:r>
+            <a:endParaRPr/>
+          </a:p>
+        </p:txBody>
+      </p:sp>
+    </p:spTree>
+  </p:cSld>
+  <p:clrMapOvr>
+    <a:masterClrMapping/>
+  </p:clrMapOvr>
+</p:notes>
+</file>
+
+<file path=ppt/notesSlides/notesSlide15.xml><?xml version="1.0" encoding="utf-8"?>
+<p:notes xmlns:a="http://schemas.openxmlformats.org/drawingml/2006/main" xmlns:r="http://schemas.openxmlformats.org/officeDocument/2006/relationships" xmlns:mc="http://schemas.openxmlformats.org/markup-compatibility/2006" xmlns:mv="urn:schemas-microsoft-com:mac:vml" xmlns:p="http://schemas.openxmlformats.org/presentationml/2006/main" xmlns:c="http://schemas.openxmlformats.org/drawingml/2006/chart" xmlns:dgm="http://schemas.openxmlformats.org/drawingml/2006/diagram" xmlns:o="urn:schemas-microsoft-com:office:office" xmlns:v="urn:schemas-microsoft-com:vml" xmlns:pvml="urn:schemas-microsoft-com:office:powerpoint" xmlns:com="http://schemas.openxmlformats.org/drawingml/2006/compatibility" xmlns:p14="http://schemas.microsoft.com/office/powerpoint/2010/main" xmlns:p15="http://schemas.microsoft.com/office/powerpoint/2012/main" showMasterPhAnim="0" showMasterSp="0">
+  <p:cSld>
+    <p:spTree>
+      <p:nvGrpSpPr>
+        <p:cNvPr id="134" name="Shape 134"/>
+        <p:cNvGrpSpPr/>
+        <p:nvPr/>
+      </p:nvGrpSpPr>
+      <p:grpSpPr>
+        <a:xfrm>
+          <a:off x="0" y="0"/>
+          <a:ext cx="0" cy="0"/>
+          <a:chOff x="0" y="0"/>
+          <a:chExt cx="0" cy="0"/>
+        </a:xfrm>
+      </p:grpSpPr>
+      <p:sp>
+        <p:nvSpPr>
+          <p:cNvPr id="135" name="Google Shape;135;g5de3adfb2a_0_20:notes"/>
+          <p:cNvSpPr/>
+          <p:nvPr>
+            <p:ph idx="2" type="sldImg"/>
+          </p:nvPr>
+        </p:nvSpPr>
+        <p:spPr>
+          <a:xfrm>
+            <a:off x="381300" y="685800"/>
+            <a:ext cx="6096000" cy="3429000"/>
+          </a:xfrm>
+          <a:custGeom>
+            <a:rect b="b" l="l" r="r" t="t"/>
+            <a:pathLst>
+              <a:path extrusionOk="0" h="120000" w="120000">
+                <a:moveTo>
+                  <a:pt x="0" y="0"/>
+                </a:moveTo>
+                <a:lnTo>
+                  <a:pt x="120000" y="0"/>
+                </a:lnTo>
+                <a:lnTo>
+                  <a:pt x="120000" y="120000"/>
+                </a:lnTo>
+                <a:lnTo>
+                  <a:pt x="0" y="120000"/>
+                </a:lnTo>
+                <a:close/>
+              </a:path>
+            </a:pathLst>
+          </a:custGeom>
+        </p:spPr>
+      </p:sp>
+      <p:sp>
+        <p:nvSpPr>
+          <p:cNvPr id="136" name="Google Shape;136;g5de3adfb2a_0_20:notes"/>
+          <p:cNvSpPr txBox="1"/>
+          <p:nvPr>
+            <p:ph idx="1" type="body"/>
+          </p:nvPr>
+        </p:nvSpPr>
+        <p:spPr>
+          <a:xfrm>
+            <a:off x="685800" y="4343400"/>
+            <a:ext cx="5486400" cy="4114800"/>
+          </a:xfrm>
+          <a:prstGeom prst="rect">
+            <a:avLst/>
+          </a:prstGeom>
+        </p:spPr>
+        <p:txBody>
+          <a:bodyPr anchorCtr="0" anchor="t" bIns="91425" lIns="91425" spcFirstLastPara="1" rIns="91425" wrap="square" tIns="91425">
+            <a:noAutofit/>
+          </a:bodyPr>
+          <a:lstStyle/>
+          <a:p>
+            <a:pPr indent="0" lvl="0" marL="0" rtl="0" algn="l">
+              <a:spcBef>
+                <a:spcPts val="0"/>
+              </a:spcBef>
+              <a:spcAft>
+                <a:spcPts val="0"/>
+              </a:spcAft>
+              <a:buNone/>
+            </a:pPr>
+            <a:r>
+              <a:rPr lang="en"/>
+              <a:t>Running a club can be tough for just one person- getting community involvement and building leadership is really important.</a:t>
+            </a:r>
+            <a:endParaRPr/>
+          </a:p>
+          <a:p>
+            <a:pPr indent="0" lvl="0" marL="0" rtl="0" algn="l">
+              <a:spcBef>
+                <a:spcPts val="0"/>
+              </a:spcBef>
+              <a:spcAft>
+                <a:spcPts val="0"/>
+              </a:spcAft>
+              <a:buNone/>
+            </a:pPr>
+            <a:r>
+              <a:t/>
+            </a:r>
+            <a:endParaRPr/>
+          </a:p>
+        </p:txBody>
+      </p:sp>
+    </p:spTree>
+  </p:cSld>
+  <p:clrMapOvr>
+    <a:masterClrMapping/>
+  </p:clrMapOvr>
+</p:notes>
+</file>
+
+<file path=ppt/notesSlides/notesSlide16.xml><?xml version="1.0" encoding="utf-8"?>
+<p:notes xmlns:a="http://schemas.openxmlformats.org/drawingml/2006/main" xmlns:r="http://schemas.openxmlformats.org/officeDocument/2006/relationships" xmlns:mc="http://schemas.openxmlformats.org/markup-compatibility/2006" xmlns:mv="urn:schemas-microsoft-com:mac:vml" xmlns:p="http://schemas.openxmlformats.org/presentationml/2006/main" xmlns:c="http://schemas.openxmlformats.org/drawingml/2006/chart" xmlns:dgm="http://schemas.openxmlformats.org/drawingml/2006/diagram" xmlns:o="urn:schemas-microsoft-com:office:office" xmlns:v="urn:schemas-microsoft-com:vml" xmlns:pvml="urn:schemas-microsoft-com:office:powerpoint" xmlns:com="http://schemas.openxmlformats.org/drawingml/2006/compatibility" xmlns:p14="http://schemas.microsoft.com/office/powerpoint/2010/main" xmlns:p15="http://schemas.microsoft.com/office/powerpoint/2012/main" showMasterPhAnim="0" showMasterSp="0">
+  <p:cSld>
+    <p:spTree>
+      <p:nvGrpSpPr>
+        <p:cNvPr id="139" name="Shape 139"/>
+        <p:cNvGrpSpPr/>
+        <p:nvPr/>
+      </p:nvGrpSpPr>
+      <p:grpSpPr>
+        <a:xfrm>
+          <a:off x="0" y="0"/>
+          <a:ext cx="0" cy="0"/>
+          <a:chOff x="0" y="0"/>
+          <a:chExt cx="0" cy="0"/>
+        </a:xfrm>
+      </p:grpSpPr>
+      <p:sp>
+        <p:nvSpPr>
+          <p:cNvPr id="140" name="Google Shape;140;g5de3adfb2a_0_16:notes"/>
+          <p:cNvSpPr/>
+          <p:nvPr>
+            <p:ph idx="2" type="sldImg"/>
+          </p:nvPr>
+        </p:nvSpPr>
+        <p:spPr>
+          <a:xfrm>
+            <a:off x="381300" y="685800"/>
+            <a:ext cx="6096000" cy="3429000"/>
+          </a:xfrm>
+          <a:custGeom>
+            <a:rect b="b" l="l" r="r" t="t"/>
+            <a:pathLst>
+              <a:path extrusionOk="0" h="120000" w="120000">
+                <a:moveTo>
+                  <a:pt x="0" y="0"/>
+                </a:moveTo>
+                <a:lnTo>
+                  <a:pt x="120000" y="0"/>
+                </a:lnTo>
+                <a:lnTo>
+                  <a:pt x="120000" y="120000"/>
+                </a:lnTo>
+                <a:lnTo>
+                  <a:pt x="0" y="120000"/>
+                </a:lnTo>
+                <a:close/>
+              </a:path>
+            </a:pathLst>
+          </a:custGeom>
+        </p:spPr>
+      </p:sp>
+      <p:sp>
+        <p:nvSpPr>
+          <p:cNvPr id="141" name="Google Shape;141;g5de3adfb2a_0_16:notes"/>
           <p:cNvSpPr txBox="1"/>
           <p:nvPr>
             <p:ph idx="1" type="body"/>
@@ -970,7 +1766,7 @@
       </p:grpSpPr>
       <p:sp>
         <p:nvSpPr>
-          <p:cNvPr id="62" name="Google Shape;62;g5de3adfb2a_0_0:notes"/>
+          <p:cNvPr id="62" name="Google Shape;62;g5df5ede70f_0_0:notes"/>
           <p:cNvSpPr/>
           <p:nvPr>
             <p:ph idx="2" type="sldImg"/>
@@ -1005,7 +1801,7 @@
       </p:sp>
       <p:sp>
         <p:nvSpPr>
-          <p:cNvPr id="63" name="Google Shape;63;g5de3adfb2a_0_0:notes"/>
+          <p:cNvPr id="63" name="Google Shape;63;g5df5ede70f_0_0:notes"/>
           <p:cNvSpPr txBox="1"/>
           <p:nvPr>
             <p:ph idx="1" type="body"/>
@@ -1037,7 +1833,7 @@
             </a:pPr>
             <a:r>
               <a:rPr lang="en"/>
-              <a:t>What is Linux Club?</a:t>
+              <a:t>Introduce ourselves</a:t>
             </a:r>
             <a:endParaRPr/>
           </a:p>
@@ -1053,7 +1849,7 @@
             </a:pPr>
             <a:r>
               <a:rPr lang="en"/>
-              <a:t>It’s a group where a bunch of nerds get to hang out together</a:t>
+              <a:t>What does FSLC do</a:t>
             </a:r>
             <a:endParaRPr/>
           </a:p>
@@ -1069,39 +1865,7 @@
             </a:pPr>
             <a:r>
               <a:rPr lang="en"/>
-              <a:t>Anecdote - when I started using linux, I didn’t know other people who were cool</a:t>
-            </a:r>
-            <a:endParaRPr/>
-          </a:p>
-          <a:p>
-            <a:pPr indent="0" lvl="0" marL="0" rtl="0" algn="l">
-              <a:spcBef>
-                <a:spcPts val="0"/>
-              </a:spcBef>
-              <a:spcAft>
-                <a:spcPts val="0"/>
-              </a:spcAft>
-              <a:buNone/>
-            </a:pPr>
-            <a:r>
-              <a:rPr lang="en"/>
-              <a:t>Membership / who shows up / improvements?</a:t>
-            </a:r>
-            <a:endParaRPr/>
-          </a:p>
-          <a:p>
-            <a:pPr indent="0" lvl="0" marL="0" rtl="0" algn="l">
-              <a:spcBef>
-                <a:spcPts val="0"/>
-              </a:spcBef>
-              <a:spcAft>
-                <a:spcPts val="0"/>
-              </a:spcAft>
-              <a:buNone/>
-            </a:pPr>
-            <a:r>
-              <a:rPr lang="en"/>
-              <a:t>Why is it important- two reasons- segue-</a:t>
+              <a:t>Membership</a:t>
             </a:r>
             <a:endParaRPr/>
           </a:p>
@@ -1134,7 +1898,7 @@
       </p:grpSpPr>
       <p:sp>
         <p:nvSpPr>
-          <p:cNvPr id="67" name="Google Shape;67;g5de3adfb2a_0_4:notes"/>
+          <p:cNvPr id="67" name="Google Shape;67;g5de3adfb2a_0_28:notes"/>
           <p:cNvSpPr/>
           <p:nvPr>
             <p:ph idx="2" type="sldImg"/>
@@ -1169,7 +1933,7 @@
       </p:sp>
       <p:sp>
         <p:nvSpPr>
-          <p:cNvPr id="68" name="Google Shape;68;g5de3adfb2a_0_4:notes"/>
+          <p:cNvPr id="68" name="Google Shape;68;g5de3adfb2a_0_28:notes"/>
           <p:cNvSpPr txBox="1"/>
           <p:nvPr>
             <p:ph idx="1" type="body"/>
@@ -1201,7 +1965,7 @@
             </a:pPr>
             <a:r>
               <a:rPr lang="en"/>
-              <a:t>fostering a CS community (which can be rare) and engaging programmers in social activities</a:t>
+              <a:t>Not everyone has the knowledge (or even the hard drive space) to install linux.</a:t>
             </a:r>
             <a:endParaRPr/>
           </a:p>
@@ -1217,7 +1981,7 @@
             </a:pPr>
             <a:r>
               <a:rPr lang="en"/>
-              <a:t>Other majors / aspects of study tend to build communities and relationships, but programmers tend to be a bit a-social</a:t>
+              <a:t>Remember- this is a commitment, and people are afraid to leave windows</a:t>
             </a:r>
             <a:endParaRPr/>
           </a:p>
@@ -1232,8 +1996,7 @@
               <a:buNone/>
             </a:pPr>
             <a:r>
-              <a:rPr lang="en"/>
-              <a:t>Creating connections is very important - also important is - </a:t>
+              <a:t/>
             </a:r>
             <a:endParaRPr/>
           </a:p>
@@ -1266,7 +2029,7 @@
       </p:grpSpPr>
       <p:sp>
         <p:nvSpPr>
-          <p:cNvPr id="72" name="Google Shape;72;g5de3adfb2a_0_8:notes"/>
+          <p:cNvPr id="72" name="Google Shape;72;g5de3adfb2a_0_32:notes"/>
           <p:cNvSpPr/>
           <p:nvPr>
             <p:ph idx="2" type="sldImg"/>
@@ -1301,7 +2064,7 @@
       </p:sp>
       <p:sp>
         <p:nvSpPr>
-          <p:cNvPr id="73" name="Google Shape;73;g5de3adfb2a_0_8:notes"/>
+          <p:cNvPr id="73" name="Google Shape;73;g5de3adfb2a_0_32:notes"/>
           <p:cNvSpPr txBox="1"/>
           <p:nvPr>
             <p:ph idx="1" type="body"/>
@@ -1333,7 +2096,7 @@
             </a:pPr>
             <a:r>
               <a:rPr lang="en"/>
-              <a:t>Some people take to linux easily, some need a hand</a:t>
+              <a:t>Over the years, we generally do Installfest at the beginning of semesters, and it’s been successful- but the drawbacks are hard to ignore</a:t>
             </a:r>
             <a:endParaRPr/>
           </a:p>
@@ -1349,23 +2112,7 @@
             </a:pPr>
             <a:r>
               <a:rPr lang="en"/>
-              <a:t>Teaching people about why linux is cool can get them interested / ahead of the game in industry techniques</a:t>
-            </a:r>
-            <a:endParaRPr/>
-          </a:p>
-          <a:p>
-            <a:pPr indent="0" lvl="0" marL="0" rtl="0" algn="l">
-              <a:spcBef>
-                <a:spcPts val="0"/>
-              </a:spcBef>
-              <a:spcAft>
-                <a:spcPts val="0"/>
-              </a:spcAft>
-              <a:buNone/>
-            </a:pPr>
-            <a:r>
-              <a:rPr lang="en"/>
-              <a:t>I got my job almost primarily off of linux experience, these are valuable skills that can be difficult to learn without introduction- making linux less scary</a:t>
+              <a:t>VM servers are cool, and if we could make an easy way / guide to do it, they would fulfill our need pretty easily. This setup will make takeover / maintenance a lot easier too.</a:t>
             </a:r>
             <a:endParaRPr/>
           </a:p>
@@ -1384,7 +2131,7 @@
   <p:cSld>
     <p:spTree>
       <p:nvGrpSpPr>
-        <p:cNvPr id="76" name="Shape 76"/>
+        <p:cNvPr id="77" name="Shape 77"/>
         <p:cNvGrpSpPr/>
         <p:nvPr/>
       </p:nvGrpSpPr>
@@ -1398,7 +2145,7 @@
       </p:grpSpPr>
       <p:sp>
         <p:nvSpPr>
-          <p:cNvPr id="77" name="Google Shape;77;g5de3adfb2a_0_12:notes"/>
+          <p:cNvPr id="78" name="Google Shape;78;g5df5ede70f_0_7:notes"/>
           <p:cNvSpPr/>
           <p:nvPr>
             <p:ph idx="2" type="sldImg"/>
@@ -1433,7 +2180,7 @@
       </p:sp>
       <p:sp>
         <p:nvSpPr>
-          <p:cNvPr id="78" name="Google Shape;78;g5de3adfb2a_0_12:notes"/>
+          <p:cNvPr id="79" name="Google Shape;79;g5df5ede70f_0_7:notes"/>
           <p:cNvSpPr txBox="1"/>
           <p:nvPr>
             <p:ph idx="1" type="body"/>
@@ -1465,7 +2212,7 @@
             </a:pPr>
             <a:r>
               <a:rPr lang="en"/>
-              <a:t>How do we run the club? We talk about anything that interests us in linux. Usually start with introductory / beginner stuff, progress to more advanced presentations</a:t>
+              <a:t>To start, we’ll install ubuntu server on our main host machine. If you’re not familiar with Linux, go ahead and download ubuntu server from their site.</a:t>
             </a:r>
             <a:endParaRPr/>
           </a:p>
@@ -1481,7 +2228,7 @@
             </a:pPr>
             <a:r>
               <a:rPr lang="en"/>
-              <a:t>Community involvement is important here- taking time to have discussion about technical topics, or having community members give presentations about what interests them</a:t>
+              <a:t>Depending on the machine you have, it may be easier to use the alternate installer- we had to use it, but if one doesn’t work just try the other.</a:t>
             </a:r>
             <a:endParaRPr/>
           </a:p>
@@ -1500,7 +2247,7 @@
   <p:cSld>
     <p:spTree>
       <p:nvGrpSpPr>
-        <p:cNvPr id="81" name="Shape 81"/>
+        <p:cNvPr id="84" name="Shape 84"/>
         <p:cNvGrpSpPr/>
         <p:nvPr/>
       </p:nvGrpSpPr>
@@ -1514,7 +2261,7 @@
       </p:grpSpPr>
       <p:sp>
         <p:nvSpPr>
-          <p:cNvPr id="82" name="Google Shape;82;g5de3adfb2a_0_24:notes"/>
+          <p:cNvPr id="85" name="Google Shape;85;g5df5ede70f_0_15:notes"/>
           <p:cNvSpPr/>
           <p:nvPr>
             <p:ph idx="2" type="sldImg"/>
@@ -1549,7 +2296,7 @@
       </p:sp>
       <p:sp>
         <p:nvSpPr>
-          <p:cNvPr id="83" name="Google Shape;83;g5de3adfb2a_0_24:notes"/>
+          <p:cNvPr id="86" name="Google Shape;86;g5df5ede70f_0_15:notes"/>
           <p:cNvSpPr txBox="1"/>
           <p:nvPr>
             <p:ph idx="1" type="body"/>
@@ -1581,7 +2328,7 @@
             </a:pPr>
             <a:r>
               <a:rPr lang="en"/>
-              <a:t>Linux club sounds cool, and it’s definitely something you can pull off, but there’s also work that you need to put in to get the ball rolling.</a:t>
+              <a:t>For any scrubs out there using windows who’ve never made a bootable USB before, just use etcher or rufus</a:t>
             </a:r>
             <a:endParaRPr/>
           </a:p>
@@ -1597,7 +2344,23 @@
             </a:pPr>
             <a:r>
               <a:rPr lang="en"/>
-              <a:t>Here are some of the issues we ran into, and how we’ve overcome them.</a:t>
+              <a:t>Be aware that it will completely format the USB, so don’t get too attached to any saved data</a:t>
+            </a:r>
+            <a:endParaRPr/>
+          </a:p>
+          <a:p>
+            <a:pPr indent="0" lvl="0" marL="0" rtl="0" algn="l">
+              <a:spcBef>
+                <a:spcPts val="0"/>
+              </a:spcBef>
+              <a:spcAft>
+                <a:spcPts val="0"/>
+              </a:spcAft>
+              <a:buNone/>
+            </a:pPr>
+            <a:r>
+              <a:rPr lang="en"/>
+              <a:t>You may need to format your USB, setting it as MBR &amp; leave it unpartitioned is easiest</a:t>
             </a:r>
             <a:endParaRPr/>
           </a:p>
@@ -1631,7 +2394,7 @@
   <p:cSld>
     <p:spTree>
       <p:nvGrpSpPr>
-        <p:cNvPr id="86" name="Shape 86"/>
+        <p:cNvPr id="90" name="Shape 90"/>
         <p:cNvGrpSpPr/>
         <p:nvPr/>
       </p:nvGrpSpPr>
@@ -1645,7 +2408,7 @@
       </p:grpSpPr>
       <p:sp>
         <p:nvSpPr>
-          <p:cNvPr id="87" name="Google Shape;87;g5de3adfb2a_0_20:notes"/>
+          <p:cNvPr id="91" name="Google Shape;91;g5df5ede70f_0_22:notes"/>
           <p:cNvSpPr/>
           <p:nvPr>
             <p:ph idx="2" type="sldImg"/>
@@ -1680,7 +2443,7 @@
       </p:sp>
       <p:sp>
         <p:nvSpPr>
-          <p:cNvPr id="88" name="Google Shape;88;g5de3adfb2a_0_20:notes"/>
+          <p:cNvPr id="92" name="Google Shape;92;g5df5ede70f_0_22:notes"/>
           <p:cNvSpPr txBox="1"/>
           <p:nvPr>
             <p:ph idx="1" type="body"/>
@@ -1712,22 +2475,7 @@
             </a:pPr>
             <a:r>
               <a:rPr lang="en"/>
-              <a:t>Running a club can be tough for just one person- getting community involvement and building leadership is really important.</a:t>
-            </a:r>
-            <a:endParaRPr/>
-          </a:p>
-          <a:p>
-            <a:pPr indent="0" lvl="0" marL="0" rtl="0" algn="l">
-              <a:spcBef>
-                <a:spcPts val="0"/>
-              </a:spcBef>
-              <a:spcAft>
-                <a:spcPts val="0"/>
-              </a:spcAft>
-              <a:buNone/>
-            </a:pPr>
-            <a:r>
-              <a:t/>
+              <a:t>If you’re cool and use a unix-based system, you can do this in a terminal with just a couple commands.</a:t>
             </a:r>
             <a:endParaRPr/>
           </a:p>
@@ -1746,7 +2494,7 @@
   <p:cSld>
     <p:spTree>
       <p:nvGrpSpPr>
-        <p:cNvPr id="91" name="Shape 91"/>
+        <p:cNvPr id="97" name="Shape 97"/>
         <p:cNvGrpSpPr/>
         <p:nvPr/>
       </p:nvGrpSpPr>
@@ -1760,7 +2508,7 @@
       </p:grpSpPr>
       <p:sp>
         <p:nvSpPr>
-          <p:cNvPr id="92" name="Google Shape;92;g5de3adfb2a_0_28:notes"/>
+          <p:cNvPr id="98" name="Google Shape;98;g5df5ede70f_0_29:notes"/>
           <p:cNvSpPr/>
           <p:nvPr>
             <p:ph idx="2" type="sldImg"/>
@@ -1795,7 +2543,7 @@
       </p:sp>
       <p:sp>
         <p:nvSpPr>
-          <p:cNvPr id="93" name="Google Shape;93;g5de3adfb2a_0_28:notes"/>
+          <p:cNvPr id="99" name="Google Shape;99;g5df5ede70f_0_29:notes"/>
           <p:cNvSpPr txBox="1"/>
           <p:nvPr>
             <p:ph idx="1" type="body"/>
@@ -1827,38 +2575,7 @@
             </a:pPr>
             <a:r>
               <a:rPr lang="en"/>
-              <a:t>Not everyone has the knowledge (or even the hard drive space) to install linux.</a:t>
-            </a:r>
-            <a:endParaRPr/>
-          </a:p>
-          <a:p>
-            <a:pPr indent="0" lvl="0" marL="0" rtl="0" algn="l">
-              <a:spcBef>
-                <a:spcPts val="0"/>
-              </a:spcBef>
-              <a:spcAft>
-                <a:spcPts val="0"/>
-              </a:spcAft>
-              <a:buNone/>
-            </a:pPr>
-            <a:r>
-              <a:rPr lang="en"/>
-              <a:t>Remember- this is a commitment, and people are afraid to leave windows</a:t>
-            </a:r>
-            <a:endParaRPr/>
-          </a:p>
-          <a:p>
-            <a:pPr indent="0" lvl="0" marL="0" rtl="0" algn="l">
-              <a:spcBef>
-                <a:spcPts val="0"/>
-              </a:spcBef>
-              <a:spcAft>
-                <a:spcPts val="0"/>
-              </a:spcAft>
-              <a:buNone/>
-            </a:pPr>
-            <a:r>
-              <a:t/>
+              <a:t>Go ahead and plug in your USB to your server and install. Once complete, you should have a barebones ubuntu server. </a:t>
             </a:r>
             <a:endParaRPr/>
           </a:p>
@@ -1877,7 +2594,7 @@
   <p:cSld>
     <p:spTree>
       <p:nvGrpSpPr>
-        <p:cNvPr id="96" name="Shape 96"/>
+        <p:cNvPr id="103" name="Shape 103"/>
         <p:cNvGrpSpPr/>
         <p:nvPr/>
       </p:nvGrpSpPr>
@@ -1891,7 +2608,7 @@
       </p:grpSpPr>
       <p:sp>
         <p:nvSpPr>
-          <p:cNvPr id="97" name="Google Shape;97;g5de3adfb2a_0_32:notes"/>
+          <p:cNvPr id="104" name="Google Shape;104;g5df5ede70f_0_36:notes"/>
           <p:cNvSpPr/>
           <p:nvPr>
             <p:ph idx="2" type="sldImg"/>
@@ -1926,7 +2643,7 @@
       </p:sp>
       <p:sp>
         <p:nvSpPr>
-          <p:cNvPr id="98" name="Google Shape;98;g5de3adfb2a_0_32:notes"/>
+          <p:cNvPr id="105" name="Google Shape;105;g5df5ede70f_0_36:notes"/>
           <p:cNvSpPr txBox="1"/>
           <p:nvPr>
             <p:ph idx="1" type="body"/>
@@ -1957,24 +2674,7 @@
               <a:buNone/>
             </a:pPr>
             <a:r>
-              <a:rPr lang="en"/>
-              <a:t>Not everyone has the knowledge (or even the hard drive space) to install linux.</a:t>
-            </a:r>
-            <a:endParaRPr/>
-          </a:p>
-          <a:p>
-            <a:pPr indent="0" lvl="0" marL="0" rtl="0" algn="l">
-              <a:spcBef>
-                <a:spcPts val="0"/>
-              </a:spcBef>
-              <a:spcAft>
-                <a:spcPts val="0"/>
-              </a:spcAft>
-              <a:buNone/>
-            </a:pPr>
-            <a:r>
-              <a:rPr lang="en"/>
-              <a:t>Remember- this is a commitment, and people are afraid to leave windows</a:t>
+              <a:t/>
             </a:r>
             <a:endParaRPr/>
           </a:p>
@@ -7333,7 +8033,7 @@
   <p:cSld>
     <p:spTree>
       <p:nvGrpSpPr>
-        <p:cNvPr id="105" name="Shape 105"/>
+        <p:cNvPr id="112" name="Shape 112"/>
         <p:cNvGrpSpPr/>
         <p:nvPr/>
       </p:nvGrpSpPr>
@@ -7347,7 +8047,397 @@
       </p:grpSpPr>
       <p:sp>
         <p:nvSpPr>
-          <p:cNvPr id="106" name="Google Shape;106;p22"/>
+          <p:cNvPr id="113" name="Google Shape;113;p22"/>
+          <p:cNvSpPr txBox="1"/>
+          <p:nvPr>
+            <p:ph type="title"/>
+          </p:nvPr>
+        </p:nvSpPr>
+        <p:spPr>
+          <a:xfrm>
+            <a:off x="671250" y="2141250"/>
+            <a:ext cx="7852200" cy="861000"/>
+          </a:xfrm>
+          <a:prstGeom prst="rect">
+            <a:avLst/>
+          </a:prstGeom>
+        </p:spPr>
+        <p:txBody>
+          <a:bodyPr anchorCtr="0" anchor="ctr" bIns="91425" lIns="91425" spcFirstLastPara="1" rIns="91425" wrap="square" tIns="91425">
+            <a:noAutofit/>
+          </a:bodyPr>
+          <a:lstStyle/>
+          <a:p>
+            <a:pPr indent="0" lvl="0" marL="0" rtl="0" algn="ctr">
+              <a:spcBef>
+                <a:spcPts val="0"/>
+              </a:spcBef>
+              <a:spcAft>
+                <a:spcPts val="0"/>
+              </a:spcAft>
+              <a:buNone/>
+            </a:pPr>
+            <a:r>
+              <a:rPr lang="en"/>
+              <a:t>Linux Club- Why do you need one?</a:t>
+            </a:r>
+            <a:endParaRPr/>
+          </a:p>
+        </p:txBody>
+      </p:sp>
+    </p:spTree>
+  </p:cSld>
+  <p:clrMapOvr>
+    <a:masterClrMapping/>
+  </p:clrMapOvr>
+</p:sld>
+</file>
+
+<file path=ppt/slides/slide11.xml><?xml version="1.0" encoding="utf-8"?>
+<p:sld xmlns:a="http://schemas.openxmlformats.org/drawingml/2006/main" xmlns:r="http://schemas.openxmlformats.org/officeDocument/2006/relationships" xmlns:mc="http://schemas.openxmlformats.org/markup-compatibility/2006" xmlns:mv="urn:schemas-microsoft-com:mac:vml" xmlns:p="http://schemas.openxmlformats.org/presentationml/2006/main" xmlns:c="http://schemas.openxmlformats.org/drawingml/2006/chart" xmlns:dgm="http://schemas.openxmlformats.org/drawingml/2006/diagram" xmlns:o="urn:schemas-microsoft-com:office:office" xmlns:v="urn:schemas-microsoft-com:vml" xmlns:pvml="urn:schemas-microsoft-com:office:powerpoint" xmlns:com="http://schemas.openxmlformats.org/drawingml/2006/compatibility" xmlns:p14="http://schemas.microsoft.com/office/powerpoint/2010/main" xmlns:p15="http://schemas.microsoft.com/office/powerpoint/2012/main">
+  <p:cSld>
+    <p:spTree>
+      <p:nvGrpSpPr>
+        <p:cNvPr id="117" name="Shape 117"/>
+        <p:cNvGrpSpPr/>
+        <p:nvPr/>
+      </p:nvGrpSpPr>
+      <p:grpSpPr>
+        <a:xfrm>
+          <a:off x="0" y="0"/>
+          <a:ext cx="0" cy="0"/>
+          <a:chOff x="0" y="0"/>
+          <a:chExt cx="0" cy="0"/>
+        </a:xfrm>
+      </p:grpSpPr>
+      <p:sp>
+        <p:nvSpPr>
+          <p:cNvPr id="118" name="Google Shape;118;p23"/>
+          <p:cNvSpPr txBox="1"/>
+          <p:nvPr>
+            <p:ph type="title"/>
+          </p:nvPr>
+        </p:nvSpPr>
+        <p:spPr>
+          <a:xfrm>
+            <a:off x="671250" y="2141250"/>
+            <a:ext cx="7852200" cy="861000"/>
+          </a:xfrm>
+          <a:prstGeom prst="rect">
+            <a:avLst/>
+          </a:prstGeom>
+        </p:spPr>
+        <p:txBody>
+          <a:bodyPr anchorCtr="0" anchor="ctr" bIns="91425" lIns="91425" spcFirstLastPara="1" rIns="91425" wrap="square" tIns="91425">
+            <a:noAutofit/>
+          </a:bodyPr>
+          <a:lstStyle/>
+          <a:p>
+            <a:pPr indent="0" lvl="0" marL="0" rtl="0" algn="ctr">
+              <a:spcBef>
+                <a:spcPts val="0"/>
+              </a:spcBef>
+              <a:spcAft>
+                <a:spcPts val="0"/>
+              </a:spcAft>
+              <a:buNone/>
+            </a:pPr>
+            <a:r>
+              <a:rPr lang="en"/>
+              <a:t>Community</a:t>
+            </a:r>
+            <a:endParaRPr/>
+          </a:p>
+        </p:txBody>
+      </p:sp>
+    </p:spTree>
+  </p:cSld>
+  <p:clrMapOvr>
+    <a:masterClrMapping/>
+  </p:clrMapOvr>
+</p:sld>
+</file>
+
+<file path=ppt/slides/slide12.xml><?xml version="1.0" encoding="utf-8"?>
+<p:sld xmlns:a="http://schemas.openxmlformats.org/drawingml/2006/main" xmlns:r="http://schemas.openxmlformats.org/officeDocument/2006/relationships" xmlns:mc="http://schemas.openxmlformats.org/markup-compatibility/2006" xmlns:mv="urn:schemas-microsoft-com:mac:vml" xmlns:p="http://schemas.openxmlformats.org/presentationml/2006/main" xmlns:c="http://schemas.openxmlformats.org/drawingml/2006/chart" xmlns:dgm="http://schemas.openxmlformats.org/drawingml/2006/diagram" xmlns:o="urn:schemas-microsoft-com:office:office" xmlns:v="urn:schemas-microsoft-com:vml" xmlns:pvml="urn:schemas-microsoft-com:office:powerpoint" xmlns:com="http://schemas.openxmlformats.org/drawingml/2006/compatibility" xmlns:p14="http://schemas.microsoft.com/office/powerpoint/2010/main" xmlns:p15="http://schemas.microsoft.com/office/powerpoint/2012/main">
+  <p:cSld>
+    <p:spTree>
+      <p:nvGrpSpPr>
+        <p:cNvPr id="122" name="Shape 122"/>
+        <p:cNvGrpSpPr/>
+        <p:nvPr/>
+      </p:nvGrpSpPr>
+      <p:grpSpPr>
+        <a:xfrm>
+          <a:off x="0" y="0"/>
+          <a:ext cx="0" cy="0"/>
+          <a:chOff x="0" y="0"/>
+          <a:chExt cx="0" cy="0"/>
+        </a:xfrm>
+      </p:grpSpPr>
+      <p:sp>
+        <p:nvSpPr>
+          <p:cNvPr id="123" name="Google Shape;123;p24"/>
+          <p:cNvSpPr txBox="1"/>
+          <p:nvPr>
+            <p:ph type="title"/>
+          </p:nvPr>
+        </p:nvSpPr>
+        <p:spPr>
+          <a:xfrm>
+            <a:off x="671250" y="2141250"/>
+            <a:ext cx="7852200" cy="861000"/>
+          </a:xfrm>
+          <a:prstGeom prst="rect">
+            <a:avLst/>
+          </a:prstGeom>
+        </p:spPr>
+        <p:txBody>
+          <a:bodyPr anchorCtr="0" anchor="ctr" bIns="91425" lIns="91425" spcFirstLastPara="1" rIns="91425" wrap="square" tIns="91425">
+            <a:noAutofit/>
+          </a:bodyPr>
+          <a:lstStyle/>
+          <a:p>
+            <a:pPr indent="0" lvl="0" marL="0" rtl="0" algn="ctr">
+              <a:spcBef>
+                <a:spcPts val="0"/>
+              </a:spcBef>
+              <a:spcAft>
+                <a:spcPts val="0"/>
+              </a:spcAft>
+              <a:buNone/>
+            </a:pPr>
+            <a:r>
+              <a:rPr lang="en"/>
+              <a:t>Skill Development</a:t>
+            </a:r>
+            <a:endParaRPr/>
+          </a:p>
+        </p:txBody>
+      </p:sp>
+    </p:spTree>
+  </p:cSld>
+  <p:clrMapOvr>
+    <a:masterClrMapping/>
+  </p:clrMapOvr>
+</p:sld>
+</file>
+
+<file path=ppt/slides/slide13.xml><?xml version="1.0" encoding="utf-8"?>
+<p:sld xmlns:a="http://schemas.openxmlformats.org/drawingml/2006/main" xmlns:r="http://schemas.openxmlformats.org/officeDocument/2006/relationships" xmlns:mc="http://schemas.openxmlformats.org/markup-compatibility/2006" xmlns:mv="urn:schemas-microsoft-com:mac:vml" xmlns:p="http://schemas.openxmlformats.org/presentationml/2006/main" xmlns:c="http://schemas.openxmlformats.org/drawingml/2006/chart" xmlns:dgm="http://schemas.openxmlformats.org/drawingml/2006/diagram" xmlns:o="urn:schemas-microsoft-com:office:office" xmlns:v="urn:schemas-microsoft-com:vml" xmlns:pvml="urn:schemas-microsoft-com:office:powerpoint" xmlns:com="http://schemas.openxmlformats.org/drawingml/2006/compatibility" xmlns:p14="http://schemas.microsoft.com/office/powerpoint/2010/main" xmlns:p15="http://schemas.microsoft.com/office/powerpoint/2012/main">
+  <p:cSld>
+    <p:spTree>
+      <p:nvGrpSpPr>
+        <p:cNvPr id="127" name="Shape 127"/>
+        <p:cNvGrpSpPr/>
+        <p:nvPr/>
+      </p:nvGrpSpPr>
+      <p:grpSpPr>
+        <a:xfrm>
+          <a:off x="0" y="0"/>
+          <a:ext cx="0" cy="0"/>
+          <a:chOff x="0" y="0"/>
+          <a:chExt cx="0" cy="0"/>
+        </a:xfrm>
+      </p:grpSpPr>
+      <p:sp>
+        <p:nvSpPr>
+          <p:cNvPr id="128" name="Google Shape;128;p25"/>
+          <p:cNvSpPr txBox="1"/>
+          <p:nvPr>
+            <p:ph type="title"/>
+          </p:nvPr>
+        </p:nvSpPr>
+        <p:spPr>
+          <a:xfrm>
+            <a:off x="671250" y="2141250"/>
+            <a:ext cx="7852200" cy="861000"/>
+          </a:xfrm>
+          <a:prstGeom prst="rect">
+            <a:avLst/>
+          </a:prstGeom>
+        </p:spPr>
+        <p:txBody>
+          <a:bodyPr anchorCtr="0" anchor="ctr" bIns="91425" lIns="91425" spcFirstLastPara="1" rIns="91425" wrap="square" tIns="91425">
+            <a:noAutofit/>
+          </a:bodyPr>
+          <a:lstStyle/>
+          <a:p>
+            <a:pPr indent="0" lvl="0" marL="0" rtl="0" algn="ctr">
+              <a:spcBef>
+                <a:spcPts val="0"/>
+              </a:spcBef>
+              <a:spcAft>
+                <a:spcPts val="0"/>
+              </a:spcAft>
+              <a:buNone/>
+            </a:pPr>
+            <a:r>
+              <a:rPr lang="en"/>
+              <a:t>Linux Club- What</a:t>
+            </a:r>
+            <a:endParaRPr/>
+          </a:p>
+        </p:txBody>
+      </p:sp>
+    </p:spTree>
+  </p:cSld>
+  <p:clrMapOvr>
+    <a:masterClrMapping/>
+  </p:clrMapOvr>
+</p:sld>
+</file>
+
+<file path=ppt/slides/slide14.xml><?xml version="1.0" encoding="utf-8"?>
+<p:sld xmlns:a="http://schemas.openxmlformats.org/drawingml/2006/main" xmlns:r="http://schemas.openxmlformats.org/officeDocument/2006/relationships" xmlns:mc="http://schemas.openxmlformats.org/markup-compatibility/2006" xmlns:mv="urn:schemas-microsoft-com:mac:vml" xmlns:p="http://schemas.openxmlformats.org/presentationml/2006/main" xmlns:c="http://schemas.openxmlformats.org/drawingml/2006/chart" xmlns:dgm="http://schemas.openxmlformats.org/drawingml/2006/diagram" xmlns:o="urn:schemas-microsoft-com:office:office" xmlns:v="urn:schemas-microsoft-com:vml" xmlns:pvml="urn:schemas-microsoft-com:office:powerpoint" xmlns:com="http://schemas.openxmlformats.org/drawingml/2006/compatibility" xmlns:p14="http://schemas.microsoft.com/office/powerpoint/2010/main" xmlns:p15="http://schemas.microsoft.com/office/powerpoint/2012/main">
+  <p:cSld>
+    <p:spTree>
+      <p:nvGrpSpPr>
+        <p:cNvPr id="132" name="Shape 132"/>
+        <p:cNvGrpSpPr/>
+        <p:nvPr/>
+      </p:nvGrpSpPr>
+      <p:grpSpPr>
+        <a:xfrm>
+          <a:off x="0" y="0"/>
+          <a:ext cx="0" cy="0"/>
+          <a:chOff x="0" y="0"/>
+          <a:chExt cx="0" cy="0"/>
+        </a:xfrm>
+      </p:grpSpPr>
+      <p:sp>
+        <p:nvSpPr>
+          <p:cNvPr id="133" name="Google Shape;133;p26"/>
+          <p:cNvSpPr txBox="1"/>
+          <p:nvPr>
+            <p:ph type="title"/>
+          </p:nvPr>
+        </p:nvSpPr>
+        <p:spPr>
+          <a:xfrm>
+            <a:off x="671250" y="2141250"/>
+            <a:ext cx="7852200" cy="861000"/>
+          </a:xfrm>
+          <a:prstGeom prst="rect">
+            <a:avLst/>
+          </a:prstGeom>
+        </p:spPr>
+        <p:txBody>
+          <a:bodyPr anchorCtr="0" anchor="ctr" bIns="91425" lIns="91425" spcFirstLastPara="1" rIns="91425" wrap="square" tIns="91425">
+            <a:noAutofit/>
+          </a:bodyPr>
+          <a:lstStyle/>
+          <a:p>
+            <a:pPr indent="0" lvl="0" marL="0" rtl="0" algn="ctr">
+              <a:spcBef>
+                <a:spcPts val="0"/>
+              </a:spcBef>
+              <a:spcAft>
+                <a:spcPts val="0"/>
+              </a:spcAft>
+              <a:buNone/>
+            </a:pPr>
+            <a:r>
+              <a:rPr lang="en"/>
+              <a:t>Challenges &amp; Solutions</a:t>
+            </a:r>
+            <a:endParaRPr/>
+          </a:p>
+        </p:txBody>
+      </p:sp>
+    </p:spTree>
+  </p:cSld>
+  <p:clrMapOvr>
+    <a:masterClrMapping/>
+  </p:clrMapOvr>
+</p:sld>
+</file>
+
+<file path=ppt/slides/slide15.xml><?xml version="1.0" encoding="utf-8"?>
+<p:sld xmlns:a="http://schemas.openxmlformats.org/drawingml/2006/main" xmlns:r="http://schemas.openxmlformats.org/officeDocument/2006/relationships" xmlns:mc="http://schemas.openxmlformats.org/markup-compatibility/2006" xmlns:mv="urn:schemas-microsoft-com:mac:vml" xmlns:p="http://schemas.openxmlformats.org/presentationml/2006/main" xmlns:c="http://schemas.openxmlformats.org/drawingml/2006/chart" xmlns:dgm="http://schemas.openxmlformats.org/drawingml/2006/diagram" xmlns:o="urn:schemas-microsoft-com:office:office" xmlns:v="urn:schemas-microsoft-com:vml" xmlns:pvml="urn:schemas-microsoft-com:office:powerpoint" xmlns:com="http://schemas.openxmlformats.org/drawingml/2006/compatibility" xmlns:p14="http://schemas.microsoft.com/office/powerpoint/2010/main" xmlns:p15="http://schemas.microsoft.com/office/powerpoint/2012/main">
+  <p:cSld>
+    <p:spTree>
+      <p:nvGrpSpPr>
+        <p:cNvPr id="137" name="Shape 137"/>
+        <p:cNvGrpSpPr/>
+        <p:nvPr/>
+      </p:nvGrpSpPr>
+      <p:grpSpPr>
+        <a:xfrm>
+          <a:off x="0" y="0"/>
+          <a:ext cx="0" cy="0"/>
+          <a:chOff x="0" y="0"/>
+          <a:chExt cx="0" cy="0"/>
+        </a:xfrm>
+      </p:grpSpPr>
+      <p:sp>
+        <p:nvSpPr>
+          <p:cNvPr id="138" name="Google Shape;138;p27"/>
+          <p:cNvSpPr txBox="1"/>
+          <p:nvPr>
+            <p:ph type="title"/>
+          </p:nvPr>
+        </p:nvSpPr>
+        <p:spPr>
+          <a:xfrm>
+            <a:off x="671250" y="2141250"/>
+            <a:ext cx="7852200" cy="861000"/>
+          </a:xfrm>
+          <a:prstGeom prst="rect">
+            <a:avLst/>
+          </a:prstGeom>
+        </p:spPr>
+        <p:txBody>
+          <a:bodyPr anchorCtr="0" anchor="ctr" bIns="91425" lIns="91425" spcFirstLastPara="1" rIns="91425" wrap="square" tIns="91425">
+            <a:noAutofit/>
+          </a:bodyPr>
+          <a:lstStyle/>
+          <a:p>
+            <a:pPr indent="0" lvl="0" marL="0" rtl="0" algn="ctr">
+              <a:spcBef>
+                <a:spcPts val="0"/>
+              </a:spcBef>
+              <a:spcAft>
+                <a:spcPts val="0"/>
+              </a:spcAft>
+              <a:buNone/>
+            </a:pPr>
+            <a:r>
+              <a:rPr lang="en"/>
+              <a:t>Not a 1-man job</a:t>
+            </a:r>
+            <a:endParaRPr/>
+          </a:p>
+        </p:txBody>
+      </p:sp>
+    </p:spTree>
+  </p:cSld>
+  <p:clrMapOvr>
+    <a:masterClrMapping/>
+  </p:clrMapOvr>
+</p:sld>
+</file>
+
+<file path=ppt/slides/slide16.xml><?xml version="1.0" encoding="utf-8"?>
+<p:sld xmlns:a="http://schemas.openxmlformats.org/drawingml/2006/main" xmlns:r="http://schemas.openxmlformats.org/officeDocument/2006/relationships" xmlns:mc="http://schemas.openxmlformats.org/markup-compatibility/2006" xmlns:mv="urn:schemas-microsoft-com:mac:vml" xmlns:p="http://schemas.openxmlformats.org/presentationml/2006/main" xmlns:c="http://schemas.openxmlformats.org/drawingml/2006/chart" xmlns:dgm="http://schemas.openxmlformats.org/drawingml/2006/diagram" xmlns:o="urn:schemas-microsoft-com:office:office" xmlns:v="urn:schemas-microsoft-com:vml" xmlns:pvml="urn:schemas-microsoft-com:office:powerpoint" xmlns:com="http://schemas.openxmlformats.org/drawingml/2006/compatibility" xmlns:p14="http://schemas.microsoft.com/office/powerpoint/2010/main" xmlns:p15="http://schemas.microsoft.com/office/powerpoint/2012/main">
+  <p:cSld>
+    <p:spTree>
+      <p:nvGrpSpPr>
+        <p:cNvPr id="142" name="Shape 142"/>
+        <p:cNvGrpSpPr/>
+        <p:nvPr/>
+      </p:nvGrpSpPr>
+      <p:grpSpPr>
+        <a:xfrm>
+          <a:off x="0" y="0"/>
+          <a:ext cx="0" cy="0"/>
+          <a:chOff x="0" y="0"/>
+          <a:chExt cx="0" cy="0"/>
+        </a:xfrm>
+      </p:grpSpPr>
+      <p:sp>
+        <p:nvSpPr>
+          <p:cNvPr id="143" name="Google Shape;143;p28"/>
           <p:cNvSpPr txBox="1"/>
           <p:nvPr>
             <p:ph type="title"/>
@@ -7444,7 +8534,7 @@
             </a:pPr>
             <a:r>
               <a:rPr lang="en"/>
-              <a:t>Linux Club- Why do you need one?</a:t>
+              <a:t>USU Free Software &amp; Linux Club</a:t>
             </a:r>
             <a:endParaRPr/>
           </a:p>
@@ -7509,7 +8599,7 @@
             </a:pPr>
             <a:r>
               <a:rPr lang="en"/>
-              <a:t>Community</a:t>
+              <a:t>Getting everyone a Linux box</a:t>
             </a:r>
             <a:endParaRPr/>
           </a:p>
@@ -7550,20 +8640,20 @@
         </p:nvSpPr>
         <p:spPr>
           <a:xfrm>
-            <a:off x="671250" y="2141250"/>
-            <a:ext cx="7852200" cy="861000"/>
+            <a:off x="311700" y="445025"/>
+            <a:ext cx="8520600" cy="572700"/>
           </a:xfrm>
           <a:prstGeom prst="rect">
             <a:avLst/>
           </a:prstGeom>
         </p:spPr>
         <p:txBody>
-          <a:bodyPr anchorCtr="0" anchor="ctr" bIns="91425" lIns="91425" spcFirstLastPara="1" rIns="91425" wrap="square" tIns="91425">
+          <a:bodyPr anchorCtr="0" anchor="t" bIns="91425" lIns="91425" spcFirstLastPara="1" rIns="91425" wrap="square" tIns="91425">
             <a:noAutofit/>
           </a:bodyPr>
           <a:lstStyle/>
           <a:p>
-            <a:pPr indent="0" lvl="0" marL="0" rtl="0" algn="ctr">
+            <a:pPr indent="0" lvl="0" marL="0" rtl="0" algn="l">
               <a:spcBef>
                 <a:spcPts val="0"/>
               </a:spcBef>
@@ -7574,9 +8664,201 @@
             </a:pPr>
             <a:r>
               <a:rPr lang="en"/>
-              <a:t>Skill Development</a:t>
+              <a:t>Getting everyone a Linux Box- two ways to fix this</a:t>
             </a:r>
             <a:endParaRPr/>
+          </a:p>
+        </p:txBody>
+      </p:sp>
+      <p:sp>
+        <p:nvSpPr>
+          <p:cNvPr id="76" name="Google Shape;76;p16"/>
+          <p:cNvSpPr txBox="1"/>
+          <p:nvPr>
+            <p:ph idx="1" type="body"/>
+          </p:nvPr>
+        </p:nvSpPr>
+        <p:spPr>
+          <a:xfrm>
+            <a:off x="311700" y="1152475"/>
+            <a:ext cx="8520600" cy="3416400"/>
+          </a:xfrm>
+          <a:prstGeom prst="rect">
+            <a:avLst/>
+          </a:prstGeom>
+        </p:spPr>
+        <p:txBody>
+          <a:bodyPr anchorCtr="0" anchor="t" bIns="91425" lIns="91425" spcFirstLastPara="1" rIns="91425" wrap="square" tIns="91425">
+            <a:noAutofit/>
+          </a:bodyPr>
+          <a:lstStyle/>
+          <a:p>
+            <a:pPr indent="-381000" lvl="0" marL="457200" rtl="0" algn="l">
+              <a:spcBef>
+                <a:spcPts val="0"/>
+              </a:spcBef>
+              <a:spcAft>
+                <a:spcPts val="0"/>
+              </a:spcAft>
+              <a:buSzPts val="2400"/>
+              <a:buFont typeface="Oswald"/>
+              <a:buAutoNum type="arabicPeriod"/>
+            </a:pPr>
+            <a:r>
+              <a:rPr lang="en" sz="2400">
+                <a:latin typeface="Oswald"/>
+                <a:ea typeface="Oswald"/>
+                <a:cs typeface="Oswald"/>
+                <a:sym typeface="Oswald"/>
+              </a:rPr>
+              <a:t>InstallFest</a:t>
+            </a:r>
+            <a:endParaRPr sz="2400">
+              <a:latin typeface="Oswald"/>
+              <a:ea typeface="Oswald"/>
+              <a:cs typeface="Oswald"/>
+              <a:sym typeface="Oswald"/>
+            </a:endParaRPr>
+          </a:p>
+          <a:p>
+            <a:pPr indent="-381000" lvl="1" marL="914400" rtl="0" algn="l">
+              <a:spcBef>
+                <a:spcPts val="0"/>
+              </a:spcBef>
+              <a:spcAft>
+                <a:spcPts val="0"/>
+              </a:spcAft>
+              <a:buSzPts val="2400"/>
+              <a:buFont typeface="Oswald"/>
+              <a:buChar char="○"/>
+            </a:pPr>
+            <a:r>
+              <a:rPr lang="en" sz="2400">
+                <a:latin typeface="Oswald"/>
+                <a:ea typeface="Oswald"/>
+                <a:cs typeface="Oswald"/>
+                <a:sym typeface="Oswald"/>
+              </a:rPr>
+              <a:t>Pros- community building</a:t>
+            </a:r>
+            <a:endParaRPr sz="2400">
+              <a:latin typeface="Oswald"/>
+              <a:ea typeface="Oswald"/>
+              <a:cs typeface="Oswald"/>
+              <a:sym typeface="Oswald"/>
+            </a:endParaRPr>
+          </a:p>
+          <a:p>
+            <a:pPr indent="-381000" lvl="1" marL="914400" rtl="0" algn="l">
+              <a:spcBef>
+                <a:spcPts val="0"/>
+              </a:spcBef>
+              <a:spcAft>
+                <a:spcPts val="0"/>
+              </a:spcAft>
+              <a:buSzPts val="2400"/>
+              <a:buFont typeface="Oswald"/>
+              <a:buChar char="○"/>
+            </a:pPr>
+            <a:r>
+              <a:rPr lang="en" sz="2400">
+                <a:latin typeface="Oswald"/>
+                <a:ea typeface="Oswald"/>
+                <a:cs typeface="Oswald"/>
+                <a:sym typeface="Oswald"/>
+              </a:rPr>
+              <a:t>Cons- bricked machines, debugging</a:t>
+            </a:r>
+            <a:endParaRPr sz="2400">
+              <a:latin typeface="Oswald"/>
+              <a:ea typeface="Oswald"/>
+              <a:cs typeface="Oswald"/>
+              <a:sym typeface="Oswald"/>
+            </a:endParaRPr>
+          </a:p>
+          <a:p>
+            <a:pPr indent="-381000" lvl="0" marL="457200" rtl="0" algn="l">
+              <a:spcBef>
+                <a:spcPts val="0"/>
+              </a:spcBef>
+              <a:spcAft>
+                <a:spcPts val="0"/>
+              </a:spcAft>
+              <a:buSzPts val="2400"/>
+              <a:buFont typeface="Oswald"/>
+              <a:buAutoNum type="arabicPeriod"/>
+            </a:pPr>
+            <a:r>
+              <a:rPr lang="en" sz="2400">
+                <a:latin typeface="Oswald"/>
+                <a:ea typeface="Oswald"/>
+                <a:cs typeface="Oswald"/>
+                <a:sym typeface="Oswald"/>
+              </a:rPr>
+              <a:t>VM Server</a:t>
+            </a:r>
+            <a:endParaRPr sz="2400">
+              <a:latin typeface="Oswald"/>
+              <a:ea typeface="Oswald"/>
+              <a:cs typeface="Oswald"/>
+              <a:sym typeface="Oswald"/>
+            </a:endParaRPr>
+          </a:p>
+          <a:p>
+            <a:pPr indent="-381000" lvl="1" marL="914400" rtl="0" algn="l">
+              <a:spcBef>
+                <a:spcPts val="0"/>
+              </a:spcBef>
+              <a:spcAft>
+                <a:spcPts val="0"/>
+              </a:spcAft>
+              <a:buSzPts val="2400"/>
+              <a:buFont typeface="Oswald"/>
+              <a:buChar char="○"/>
+            </a:pPr>
+            <a:r>
+              <a:rPr lang="en" sz="2400">
+                <a:latin typeface="Oswald"/>
+                <a:ea typeface="Oswald"/>
+                <a:cs typeface="Oswald"/>
+                <a:sym typeface="Oswald"/>
+              </a:rPr>
+              <a:t>Pros- quick and easy new machines</a:t>
+            </a:r>
+            <a:endParaRPr sz="2400">
+              <a:latin typeface="Oswald"/>
+              <a:ea typeface="Oswald"/>
+              <a:cs typeface="Oswald"/>
+              <a:sym typeface="Oswald"/>
+            </a:endParaRPr>
+          </a:p>
+          <a:p>
+            <a:pPr indent="-381000" lvl="1" marL="914400" rtl="0" algn="l">
+              <a:spcBef>
+                <a:spcPts val="0"/>
+              </a:spcBef>
+              <a:spcAft>
+                <a:spcPts val="0"/>
+              </a:spcAft>
+              <a:buSzPts val="2400"/>
+              <a:buFont typeface="Oswald"/>
+              <a:buChar char="○"/>
+            </a:pPr>
+            <a:r>
+              <a:rPr lang="en" sz="2400">
+                <a:latin typeface="Oswald"/>
+                <a:ea typeface="Oswald"/>
+                <a:cs typeface="Oswald"/>
+                <a:sym typeface="Oswald"/>
+              </a:rPr>
+              <a:t>Cons- networking &amp; administration</a:t>
+            </a:r>
+            <a:endParaRPr sz="2400">
+              <a:latin typeface="Oswald"/>
+              <a:ea typeface="Oswald"/>
+              <a:cs typeface="Oswald"/>
+              <a:sym typeface="Oswald"/>
+            </a:endParaRPr>
           </a:p>
         </p:txBody>
       </p:sp>
@@ -7593,7 +8875,7 @@
   <p:cSld>
     <p:spTree>
       <p:nvGrpSpPr>
-        <p:cNvPr id="79" name="Shape 79"/>
+        <p:cNvPr id="80" name="Shape 80"/>
         <p:cNvGrpSpPr/>
         <p:nvPr/>
       </p:nvGrpSpPr>
@@ -7607,7 +8889,503 @@
       </p:grpSpPr>
       <p:sp>
         <p:nvSpPr>
-          <p:cNvPr id="80" name="Google Shape;80;p17"/>
+          <p:cNvPr id="81" name="Google Shape;81;p17"/>
+          <p:cNvSpPr txBox="1"/>
+          <p:nvPr>
+            <p:ph type="title"/>
+          </p:nvPr>
+        </p:nvSpPr>
+        <p:spPr>
+          <a:xfrm>
+            <a:off x="311700" y="445025"/>
+            <a:ext cx="8520600" cy="572700"/>
+          </a:xfrm>
+          <a:prstGeom prst="rect">
+            <a:avLst/>
+          </a:prstGeom>
+        </p:spPr>
+        <p:txBody>
+          <a:bodyPr anchorCtr="0" anchor="t" bIns="91425" lIns="91425" spcFirstLastPara="1" rIns="91425" wrap="square" tIns="91425">
+            <a:noAutofit/>
+          </a:bodyPr>
+          <a:lstStyle/>
+          <a:p>
+            <a:pPr indent="0" lvl="0" marL="0" rtl="0" algn="l">
+              <a:spcBef>
+                <a:spcPts val="0"/>
+              </a:spcBef>
+              <a:spcAft>
+                <a:spcPts val="0"/>
+              </a:spcAft>
+              <a:buNone/>
+            </a:pPr>
+            <a:r>
+              <a:rPr lang="en"/>
+              <a:t>Download ISO</a:t>
+            </a:r>
+            <a:endParaRPr/>
+          </a:p>
+        </p:txBody>
+      </p:sp>
+      <p:sp>
+        <p:nvSpPr>
+          <p:cNvPr id="82" name="Google Shape;82;p17"/>
+          <p:cNvSpPr txBox="1"/>
+          <p:nvPr>
+            <p:ph idx="1" type="body"/>
+          </p:nvPr>
+        </p:nvSpPr>
+        <p:spPr>
+          <a:xfrm>
+            <a:off x="311700" y="1152475"/>
+            <a:ext cx="8520600" cy="3416400"/>
+          </a:xfrm>
+          <a:prstGeom prst="rect">
+            <a:avLst/>
+          </a:prstGeom>
+        </p:spPr>
+        <p:txBody>
+          <a:bodyPr anchorCtr="0" anchor="t" bIns="91425" lIns="91425" spcFirstLastPara="1" rIns="91425" wrap="square" tIns="91425">
+            <a:noAutofit/>
+          </a:bodyPr>
+          <a:lstStyle/>
+          <a:p>
+            <a:pPr indent="0" lvl="0" marL="0" rtl="0" algn="l">
+              <a:spcBef>
+                <a:spcPts val="0"/>
+              </a:spcBef>
+              <a:spcAft>
+                <a:spcPts val="1600"/>
+              </a:spcAft>
+              <a:buNone/>
+            </a:pPr>
+            <a:r>
+              <a:t/>
+            </a:r>
+            <a:endParaRPr sz="2400">
+              <a:latin typeface="Consolas"/>
+              <a:ea typeface="Consolas"/>
+              <a:cs typeface="Consolas"/>
+              <a:sym typeface="Consolas"/>
+            </a:endParaRPr>
+          </a:p>
+        </p:txBody>
+      </p:sp>
+      <p:pic>
+        <p:nvPicPr>
+          <p:cNvPr id="83" name="Google Shape;83;p17"/>
+          <p:cNvPicPr preferRelativeResize="0"/>
+          <p:nvPr/>
+        </p:nvPicPr>
+        <p:blipFill>
+          <a:blip r:embed="rId3">
+            <a:alphaModFix/>
+          </a:blip>
+          <a:stretch>
+            <a:fillRect/>
+          </a:stretch>
+        </p:blipFill>
+        <p:spPr>
+          <a:xfrm>
+            <a:off x="270200" y="1303112"/>
+            <a:ext cx="8520602" cy="3115135"/>
+          </a:xfrm>
+          <a:prstGeom prst="rect">
+            <a:avLst/>
+          </a:prstGeom>
+          <a:noFill/>
+          <a:ln>
+            <a:noFill/>
+          </a:ln>
+        </p:spPr>
+      </p:pic>
+    </p:spTree>
+  </p:cSld>
+  <p:clrMapOvr>
+    <a:masterClrMapping/>
+  </p:clrMapOvr>
+</p:sld>
+</file>
+
+<file path=ppt/slides/slide6.xml><?xml version="1.0" encoding="utf-8"?>
+<p:sld xmlns:a="http://schemas.openxmlformats.org/drawingml/2006/main" xmlns:r="http://schemas.openxmlformats.org/officeDocument/2006/relationships" xmlns:mc="http://schemas.openxmlformats.org/markup-compatibility/2006" xmlns:mv="urn:schemas-microsoft-com:mac:vml" xmlns:p="http://schemas.openxmlformats.org/presentationml/2006/main" xmlns:c="http://schemas.openxmlformats.org/drawingml/2006/chart" xmlns:dgm="http://schemas.openxmlformats.org/drawingml/2006/diagram" xmlns:o="urn:schemas-microsoft-com:office:office" xmlns:v="urn:schemas-microsoft-com:vml" xmlns:pvml="urn:schemas-microsoft-com:office:powerpoint" xmlns:com="http://schemas.openxmlformats.org/drawingml/2006/compatibility" xmlns:p14="http://schemas.microsoft.com/office/powerpoint/2010/main" xmlns:p15="http://schemas.microsoft.com/office/powerpoint/2012/main">
+  <p:cSld>
+    <p:spTree>
+      <p:nvGrpSpPr>
+        <p:cNvPr id="87" name="Shape 87"/>
+        <p:cNvGrpSpPr/>
+        <p:nvPr/>
+      </p:nvGrpSpPr>
+      <p:grpSpPr>
+        <a:xfrm>
+          <a:off x="0" y="0"/>
+          <a:ext cx="0" cy="0"/>
+          <a:chOff x="0" y="0"/>
+          <a:chExt cx="0" cy="0"/>
+        </a:xfrm>
+      </p:grpSpPr>
+      <p:sp>
+        <p:nvSpPr>
+          <p:cNvPr id="88" name="Google Shape;88;p18"/>
+          <p:cNvSpPr txBox="1"/>
+          <p:nvPr>
+            <p:ph type="title"/>
+          </p:nvPr>
+        </p:nvSpPr>
+        <p:spPr>
+          <a:xfrm>
+            <a:off x="311700" y="445025"/>
+            <a:ext cx="8520600" cy="572700"/>
+          </a:xfrm>
+          <a:prstGeom prst="rect">
+            <a:avLst/>
+          </a:prstGeom>
+        </p:spPr>
+        <p:txBody>
+          <a:bodyPr anchorCtr="0" anchor="t" bIns="91425" lIns="91425" spcFirstLastPara="1" rIns="91425" wrap="square" tIns="91425">
+            <a:noAutofit/>
+          </a:bodyPr>
+          <a:lstStyle/>
+          <a:p>
+            <a:pPr indent="0" lvl="0" marL="0" rtl="0" algn="ctr">
+              <a:spcBef>
+                <a:spcPts val="0"/>
+              </a:spcBef>
+              <a:spcAft>
+                <a:spcPts val="0"/>
+              </a:spcAft>
+              <a:buNone/>
+            </a:pPr>
+            <a:r>
+              <a:rPr lang="en"/>
+              <a:t>Bootable USB in Windows / Mac - balena.io/etcher</a:t>
+            </a:r>
+            <a:endParaRPr/>
+          </a:p>
+        </p:txBody>
+      </p:sp>
+      <p:pic>
+        <p:nvPicPr>
+          <p:cNvPr id="89" name="Google Shape;89;p18"/>
+          <p:cNvPicPr preferRelativeResize="0"/>
+          <p:nvPr/>
+        </p:nvPicPr>
+        <p:blipFill>
+          <a:blip r:embed="rId3">
+            <a:alphaModFix/>
+          </a:blip>
+          <a:stretch>
+            <a:fillRect/>
+          </a:stretch>
+        </p:blipFill>
+        <p:spPr>
+          <a:xfrm>
+            <a:off x="1657825" y="1083275"/>
+            <a:ext cx="6373611" cy="3820976"/>
+          </a:xfrm>
+          <a:prstGeom prst="rect">
+            <a:avLst/>
+          </a:prstGeom>
+          <a:noFill/>
+          <a:ln>
+            <a:noFill/>
+          </a:ln>
+        </p:spPr>
+      </p:pic>
+    </p:spTree>
+  </p:cSld>
+  <p:clrMapOvr>
+    <a:masterClrMapping/>
+  </p:clrMapOvr>
+</p:sld>
+</file>
+
+<file path=ppt/slides/slide7.xml><?xml version="1.0" encoding="utf-8"?>
+<p:sld xmlns:a="http://schemas.openxmlformats.org/drawingml/2006/main" xmlns:r="http://schemas.openxmlformats.org/officeDocument/2006/relationships" xmlns:mc="http://schemas.openxmlformats.org/markup-compatibility/2006" xmlns:mv="urn:schemas-microsoft-com:mac:vml" xmlns:p="http://schemas.openxmlformats.org/presentationml/2006/main" xmlns:c="http://schemas.openxmlformats.org/drawingml/2006/chart" xmlns:dgm="http://schemas.openxmlformats.org/drawingml/2006/diagram" xmlns:o="urn:schemas-microsoft-com:office:office" xmlns:v="urn:schemas-microsoft-com:vml" xmlns:pvml="urn:schemas-microsoft-com:office:powerpoint" xmlns:com="http://schemas.openxmlformats.org/drawingml/2006/compatibility" xmlns:p14="http://schemas.microsoft.com/office/powerpoint/2010/main" xmlns:p15="http://schemas.microsoft.com/office/powerpoint/2012/main">
+  <p:cSld>
+    <p:spTree>
+      <p:nvGrpSpPr>
+        <p:cNvPr id="93" name="Shape 93"/>
+        <p:cNvGrpSpPr/>
+        <p:nvPr/>
+      </p:nvGrpSpPr>
+      <p:grpSpPr>
+        <a:xfrm>
+          <a:off x="0" y="0"/>
+          <a:ext cx="0" cy="0"/>
+          <a:chOff x="0" y="0"/>
+          <a:chExt cx="0" cy="0"/>
+        </a:xfrm>
+      </p:grpSpPr>
+      <p:sp>
+        <p:nvSpPr>
+          <p:cNvPr id="94" name="Google Shape;94;p19"/>
+          <p:cNvSpPr txBox="1"/>
+          <p:nvPr>
+            <p:ph type="title"/>
+          </p:nvPr>
+        </p:nvSpPr>
+        <p:spPr>
+          <a:xfrm>
+            <a:off x="311700" y="445025"/>
+            <a:ext cx="8520600" cy="572700"/>
+          </a:xfrm>
+          <a:prstGeom prst="rect">
+            <a:avLst/>
+          </a:prstGeom>
+        </p:spPr>
+        <p:txBody>
+          <a:bodyPr anchorCtr="0" anchor="t" bIns="91425" lIns="91425" spcFirstLastPara="1" rIns="91425" wrap="square" tIns="91425">
+            <a:noAutofit/>
+          </a:bodyPr>
+          <a:lstStyle/>
+          <a:p>
+            <a:pPr indent="0" lvl="0" marL="0" rtl="0" algn="l">
+              <a:spcBef>
+                <a:spcPts val="0"/>
+              </a:spcBef>
+              <a:spcAft>
+                <a:spcPts val="0"/>
+              </a:spcAft>
+              <a:buNone/>
+            </a:pPr>
+            <a:r>
+              <a:rPr lang="en"/>
+              <a:t>Bootable USB for cool people</a:t>
+            </a:r>
+            <a:endParaRPr/>
+          </a:p>
+        </p:txBody>
+      </p:sp>
+      <p:sp>
+        <p:nvSpPr>
+          <p:cNvPr id="95" name="Google Shape;95;p19"/>
+          <p:cNvSpPr txBox="1"/>
+          <p:nvPr>
+            <p:ph idx="1" type="body"/>
+          </p:nvPr>
+        </p:nvSpPr>
+        <p:spPr>
+          <a:xfrm>
+            <a:off x="311700" y="1152475"/>
+            <a:ext cx="8520600" cy="3416400"/>
+          </a:xfrm>
+          <a:prstGeom prst="rect">
+            <a:avLst/>
+          </a:prstGeom>
+        </p:spPr>
+        <p:txBody>
+          <a:bodyPr anchorCtr="0" anchor="t" bIns="91425" lIns="91425" spcFirstLastPara="1" rIns="91425" wrap="square" tIns="91425">
+            <a:noAutofit/>
+          </a:bodyPr>
+          <a:lstStyle/>
+          <a:p>
+            <a:pPr indent="0" lvl="0" marL="0" rtl="0" algn="l">
+              <a:spcBef>
+                <a:spcPts val="0"/>
+              </a:spcBef>
+              <a:spcAft>
+                <a:spcPts val="0"/>
+              </a:spcAft>
+              <a:buNone/>
+            </a:pPr>
+            <a:r>
+              <a:rPr lang="en" sz="2400">
+                <a:latin typeface="Oswald"/>
+                <a:ea typeface="Oswald"/>
+                <a:cs typeface="Oswald"/>
+                <a:sym typeface="Oswald"/>
+              </a:rPr>
+              <a:t>Find your device</a:t>
+            </a:r>
+            <a:endParaRPr sz="2400">
+              <a:latin typeface="Oswald"/>
+              <a:ea typeface="Oswald"/>
+              <a:cs typeface="Oswald"/>
+              <a:sym typeface="Oswald"/>
+            </a:endParaRPr>
+          </a:p>
+          <a:p>
+            <a:pPr indent="0" lvl="0" marL="0" rtl="0" algn="l">
+              <a:spcBef>
+                <a:spcPts val="1600"/>
+              </a:spcBef>
+              <a:spcAft>
+                <a:spcPts val="0"/>
+              </a:spcAft>
+              <a:buNone/>
+            </a:pPr>
+            <a:r>
+              <a:rPr lang="en" sz="2400">
+                <a:latin typeface="Consolas"/>
+                <a:ea typeface="Consolas"/>
+                <a:cs typeface="Consolas"/>
+                <a:sym typeface="Consolas"/>
+              </a:rPr>
+              <a:t>$ lsblk  |  $ diskutil list</a:t>
+            </a:r>
+            <a:endParaRPr sz="2400">
+              <a:latin typeface="Consolas"/>
+              <a:ea typeface="Consolas"/>
+              <a:cs typeface="Consolas"/>
+              <a:sym typeface="Consolas"/>
+            </a:endParaRPr>
+          </a:p>
+          <a:p>
+            <a:pPr indent="0" lvl="0" marL="0" rtl="0" algn="l">
+              <a:spcBef>
+                <a:spcPts val="1600"/>
+              </a:spcBef>
+              <a:spcAft>
+                <a:spcPts val="0"/>
+              </a:spcAft>
+              <a:buNone/>
+            </a:pPr>
+            <a:r>
+              <a:rPr lang="en" sz="2400">
+                <a:latin typeface="Oswald"/>
+                <a:ea typeface="Oswald"/>
+                <a:cs typeface="Oswald"/>
+                <a:sym typeface="Oswald"/>
+              </a:rPr>
+              <a:t>Copy image with disk destroyer</a:t>
+            </a:r>
+            <a:endParaRPr sz="2400">
+              <a:latin typeface="Oswald"/>
+              <a:ea typeface="Oswald"/>
+              <a:cs typeface="Oswald"/>
+              <a:sym typeface="Oswald"/>
+            </a:endParaRPr>
+          </a:p>
+          <a:p>
+            <a:pPr indent="0" lvl="0" marL="0" rtl="0" algn="l">
+              <a:spcBef>
+                <a:spcPts val="1600"/>
+              </a:spcBef>
+              <a:spcAft>
+                <a:spcPts val="0"/>
+              </a:spcAft>
+              <a:buNone/>
+            </a:pPr>
+            <a:r>
+              <a:rPr lang="en" sz="2400">
+                <a:latin typeface="Consolas"/>
+                <a:ea typeface="Consolas"/>
+                <a:cs typeface="Consolas"/>
+                <a:sym typeface="Consolas"/>
+              </a:rPr>
+              <a:t>$ sudo dd if=ubuntu-server.iso of=/dev/sdX</a:t>
+            </a:r>
+            <a:endParaRPr sz="2400">
+              <a:latin typeface="Consolas"/>
+              <a:ea typeface="Consolas"/>
+              <a:cs typeface="Consolas"/>
+              <a:sym typeface="Consolas"/>
+            </a:endParaRPr>
+          </a:p>
+          <a:p>
+            <a:pPr indent="0" lvl="0" marL="0" rtl="0" algn="l">
+              <a:spcBef>
+                <a:spcPts val="1600"/>
+              </a:spcBef>
+              <a:spcAft>
+                <a:spcPts val="0"/>
+              </a:spcAft>
+              <a:buNone/>
+            </a:pPr>
+            <a:r>
+              <a:rPr lang="en" sz="2400">
+                <a:latin typeface="Oswald"/>
+                <a:ea typeface="Oswald"/>
+                <a:cs typeface="Oswald"/>
+                <a:sym typeface="Oswald"/>
+              </a:rPr>
+              <a:t>Done!</a:t>
+            </a:r>
+            <a:endParaRPr sz="2400">
+              <a:latin typeface="Consolas"/>
+              <a:ea typeface="Consolas"/>
+              <a:cs typeface="Consolas"/>
+              <a:sym typeface="Consolas"/>
+            </a:endParaRPr>
+          </a:p>
+          <a:p>
+            <a:pPr indent="0" lvl="0" marL="0" rtl="0" algn="l">
+              <a:spcBef>
+                <a:spcPts val="1600"/>
+              </a:spcBef>
+              <a:spcAft>
+                <a:spcPts val="1600"/>
+              </a:spcAft>
+              <a:buNone/>
+            </a:pPr>
+            <a:r>
+              <a:t/>
+            </a:r>
+            <a:endParaRPr sz="2400">
+              <a:latin typeface="Oswald"/>
+              <a:ea typeface="Oswald"/>
+              <a:cs typeface="Oswald"/>
+              <a:sym typeface="Oswald"/>
+            </a:endParaRPr>
+          </a:p>
+        </p:txBody>
+      </p:sp>
+      <p:pic>
+        <p:nvPicPr>
+          <p:cNvPr id="96" name="Google Shape;96;p19"/>
+          <p:cNvPicPr preferRelativeResize="0"/>
+          <p:nvPr/>
+        </p:nvPicPr>
+        <p:blipFill rotWithShape="1">
+          <a:blip r:embed="rId3">
+            <a:alphaModFix/>
+          </a:blip>
+          <a:srcRect b="0" l="297" r="9588" t="0"/>
+          <a:stretch/>
+        </p:blipFill>
+        <p:spPr>
+          <a:xfrm>
+            <a:off x="4572000" y="163500"/>
+            <a:ext cx="4376950" cy="1565100"/>
+          </a:xfrm>
+          <a:prstGeom prst="rect">
+            <a:avLst/>
+          </a:prstGeom>
+          <a:noFill/>
+          <a:ln>
+            <a:noFill/>
+          </a:ln>
+        </p:spPr>
+      </p:pic>
+    </p:spTree>
+  </p:cSld>
+  <p:clrMapOvr>
+    <a:masterClrMapping/>
+  </p:clrMapOvr>
+</p:sld>
+</file>
+
+<file path=ppt/slides/slide8.xml><?xml version="1.0" encoding="utf-8"?>
+<p:sld xmlns:a="http://schemas.openxmlformats.org/drawingml/2006/main" xmlns:r="http://schemas.openxmlformats.org/officeDocument/2006/relationships" xmlns:mc="http://schemas.openxmlformats.org/markup-compatibility/2006" xmlns:mv="urn:schemas-microsoft-com:mac:vml" xmlns:p="http://schemas.openxmlformats.org/presentationml/2006/main" xmlns:c="http://schemas.openxmlformats.org/drawingml/2006/chart" xmlns:dgm="http://schemas.openxmlformats.org/drawingml/2006/diagram" xmlns:o="urn:schemas-microsoft-com:office:office" xmlns:v="urn:schemas-microsoft-com:vml" xmlns:pvml="urn:schemas-microsoft-com:office:powerpoint" xmlns:com="http://schemas.openxmlformats.org/drawingml/2006/compatibility" xmlns:p14="http://schemas.microsoft.com/office/powerpoint/2010/main" xmlns:p15="http://schemas.microsoft.com/office/powerpoint/2012/main">
+  <p:cSld>
+    <p:spTree>
+      <p:nvGrpSpPr>
+        <p:cNvPr id="100" name="Shape 100"/>
+        <p:cNvGrpSpPr/>
+        <p:nvPr/>
+      </p:nvGrpSpPr>
+      <p:grpSpPr>
+        <a:xfrm>
+          <a:off x="0" y="0"/>
+          <a:ext cx="0" cy="0"/>
+          <a:chOff x="0" y="0"/>
+          <a:chExt cx="0" cy="0"/>
+        </a:xfrm>
+      </p:grpSpPr>
+      <p:sp>
+        <p:nvSpPr>
+          <p:cNvPr id="101" name="Google Shape;101;p20"/>
           <p:cNvSpPr txBox="1"/>
           <p:nvPr>
             <p:ph type="title"/>
@@ -7639,56 +9417,33 @@
             </a:pPr>
             <a:r>
               <a:rPr lang="en"/>
-              <a:t>Linux Club- What</a:t>
+              <a:t>Plug in USB &amp; Install</a:t>
             </a:r>
             <a:endParaRPr/>
           </a:p>
         </p:txBody>
       </p:sp>
-    </p:spTree>
-  </p:cSld>
-  <p:clrMapOvr>
-    <a:masterClrMapping/>
-  </p:clrMapOvr>
-</p:sld>
-</file>
-
-<file path=ppt/slides/slide6.xml><?xml version="1.0" encoding="utf-8"?>
-<p:sld xmlns:a="http://schemas.openxmlformats.org/drawingml/2006/main" xmlns:r="http://schemas.openxmlformats.org/officeDocument/2006/relationships" xmlns:mc="http://schemas.openxmlformats.org/markup-compatibility/2006" xmlns:mv="urn:schemas-microsoft-com:mac:vml" xmlns:p="http://schemas.openxmlformats.org/presentationml/2006/main" xmlns:c="http://schemas.openxmlformats.org/drawingml/2006/chart" xmlns:dgm="http://schemas.openxmlformats.org/drawingml/2006/diagram" xmlns:o="urn:schemas-microsoft-com:office:office" xmlns:v="urn:schemas-microsoft-com:vml" xmlns:pvml="urn:schemas-microsoft-com:office:powerpoint" xmlns:com="http://schemas.openxmlformats.org/drawingml/2006/compatibility" xmlns:p14="http://schemas.microsoft.com/office/powerpoint/2010/main" xmlns:p15="http://schemas.microsoft.com/office/powerpoint/2012/main">
-  <p:cSld>
-    <p:spTree>
-      <p:nvGrpSpPr>
-        <p:cNvPr id="84" name="Shape 84"/>
-        <p:cNvGrpSpPr/>
-        <p:nvPr/>
-      </p:nvGrpSpPr>
-      <p:grpSpPr>
-        <a:xfrm>
-          <a:off x="0" y="0"/>
-          <a:ext cx="0" cy="0"/>
-          <a:chOff x="0" y="0"/>
-          <a:chExt cx="0" cy="0"/>
-        </a:xfrm>
-      </p:grpSpPr>
       <p:sp>
         <p:nvSpPr>
-          <p:cNvPr id="85" name="Google Shape;85;p18"/>
+          <p:cNvPr id="102" name="Google Shape;102;p20"/>
           <p:cNvSpPr txBox="1"/>
-          <p:nvPr>
-            <p:ph type="title"/>
-          </p:nvPr>
+          <p:nvPr/>
         </p:nvSpPr>
         <p:spPr>
           <a:xfrm>
-            <a:off x="671250" y="2141250"/>
-            <a:ext cx="7852200" cy="861000"/>
+            <a:off x="1792800" y="3253325"/>
+            <a:ext cx="5558400" cy="648600"/>
           </a:xfrm>
           <a:prstGeom prst="rect">
             <a:avLst/>
           </a:prstGeom>
+          <a:noFill/>
+          <a:ln>
+            <a:noFill/>
+          </a:ln>
         </p:spPr>
         <p:txBody>
-          <a:bodyPr anchorCtr="0" anchor="ctr" bIns="91425" lIns="91425" spcFirstLastPara="1" rIns="91425" wrap="square" tIns="91425">
+          <a:bodyPr anchorCtr="0" anchor="t" bIns="91425" lIns="91425" spcFirstLastPara="1" rIns="91425" wrap="square" tIns="91425">
             <a:noAutofit/>
           </a:bodyPr>
           <a:lstStyle/>
@@ -7703,140 +9458,26 @@
               <a:buNone/>
             </a:pPr>
             <a:r>
-              <a:rPr lang="en"/>
-              <a:t>Challenges &amp; Solutions</a:t>
+              <a:rPr lang="en" sz="2400">
+                <a:solidFill>
+                  <a:schemeClr val="dk2"/>
+                </a:solidFill>
+                <a:latin typeface="Oswald"/>
+                <a:ea typeface="Oswald"/>
+                <a:cs typeface="Oswald"/>
+                <a:sym typeface="Oswald"/>
+              </a:rPr>
+              <a:t>Don’t forget to include OpenSSH Server!</a:t>
             </a:r>
-            <a:endParaRPr/>
-          </a:p>
-        </p:txBody>
-      </p:sp>
-    </p:spTree>
-  </p:cSld>
-  <p:clrMapOvr>
-    <a:masterClrMapping/>
-  </p:clrMapOvr>
-</p:sld>
-</file>
-
-<file path=ppt/slides/slide7.xml><?xml version="1.0" encoding="utf-8"?>
-<p:sld xmlns:a="http://schemas.openxmlformats.org/drawingml/2006/main" xmlns:r="http://schemas.openxmlformats.org/officeDocument/2006/relationships" xmlns:mc="http://schemas.openxmlformats.org/markup-compatibility/2006" xmlns:mv="urn:schemas-microsoft-com:mac:vml" xmlns:p="http://schemas.openxmlformats.org/presentationml/2006/main" xmlns:c="http://schemas.openxmlformats.org/drawingml/2006/chart" xmlns:dgm="http://schemas.openxmlformats.org/drawingml/2006/diagram" xmlns:o="urn:schemas-microsoft-com:office:office" xmlns:v="urn:schemas-microsoft-com:vml" xmlns:pvml="urn:schemas-microsoft-com:office:powerpoint" xmlns:com="http://schemas.openxmlformats.org/drawingml/2006/compatibility" xmlns:p14="http://schemas.microsoft.com/office/powerpoint/2010/main" xmlns:p15="http://schemas.microsoft.com/office/powerpoint/2012/main">
-  <p:cSld>
-    <p:spTree>
-      <p:nvGrpSpPr>
-        <p:cNvPr id="89" name="Shape 89"/>
-        <p:cNvGrpSpPr/>
-        <p:nvPr/>
-      </p:nvGrpSpPr>
-      <p:grpSpPr>
-        <a:xfrm>
-          <a:off x="0" y="0"/>
-          <a:ext cx="0" cy="0"/>
-          <a:chOff x="0" y="0"/>
-          <a:chExt cx="0" cy="0"/>
-        </a:xfrm>
-      </p:grpSpPr>
-      <p:sp>
-        <p:nvSpPr>
-          <p:cNvPr id="90" name="Google Shape;90;p19"/>
-          <p:cNvSpPr txBox="1"/>
-          <p:nvPr>
-            <p:ph type="title"/>
-          </p:nvPr>
-        </p:nvSpPr>
-        <p:spPr>
-          <a:xfrm>
-            <a:off x="671250" y="2141250"/>
-            <a:ext cx="7852200" cy="861000"/>
-          </a:xfrm>
-          <a:prstGeom prst="rect">
-            <a:avLst/>
-          </a:prstGeom>
-        </p:spPr>
-        <p:txBody>
-          <a:bodyPr anchorCtr="0" anchor="ctr" bIns="91425" lIns="91425" spcFirstLastPara="1" rIns="91425" wrap="square" tIns="91425">
-            <a:noAutofit/>
-          </a:bodyPr>
-          <a:lstStyle/>
-          <a:p>
-            <a:pPr indent="0" lvl="0" marL="0" rtl="0" algn="ctr">
-              <a:spcBef>
-                <a:spcPts val="0"/>
-              </a:spcBef>
-              <a:spcAft>
-                <a:spcPts val="0"/>
-              </a:spcAft>
-              <a:buNone/>
-            </a:pPr>
-            <a:r>
-              <a:rPr lang="en"/>
-              <a:t>Not a 1-man job</a:t>
-            </a:r>
-            <a:endParaRPr/>
-          </a:p>
-        </p:txBody>
-      </p:sp>
-    </p:spTree>
-  </p:cSld>
-  <p:clrMapOvr>
-    <a:masterClrMapping/>
-  </p:clrMapOvr>
-</p:sld>
-</file>
-
-<file path=ppt/slides/slide8.xml><?xml version="1.0" encoding="utf-8"?>
-<p:sld xmlns:a="http://schemas.openxmlformats.org/drawingml/2006/main" xmlns:r="http://schemas.openxmlformats.org/officeDocument/2006/relationships" xmlns:mc="http://schemas.openxmlformats.org/markup-compatibility/2006" xmlns:mv="urn:schemas-microsoft-com:mac:vml" xmlns:p="http://schemas.openxmlformats.org/presentationml/2006/main" xmlns:c="http://schemas.openxmlformats.org/drawingml/2006/chart" xmlns:dgm="http://schemas.openxmlformats.org/drawingml/2006/diagram" xmlns:o="urn:schemas-microsoft-com:office:office" xmlns:v="urn:schemas-microsoft-com:vml" xmlns:pvml="urn:schemas-microsoft-com:office:powerpoint" xmlns:com="http://schemas.openxmlformats.org/drawingml/2006/compatibility" xmlns:p14="http://schemas.microsoft.com/office/powerpoint/2010/main" xmlns:p15="http://schemas.microsoft.com/office/powerpoint/2012/main">
-  <p:cSld>
-    <p:spTree>
-      <p:nvGrpSpPr>
-        <p:cNvPr id="94" name="Shape 94"/>
-        <p:cNvGrpSpPr/>
-        <p:nvPr/>
-      </p:nvGrpSpPr>
-      <p:grpSpPr>
-        <a:xfrm>
-          <a:off x="0" y="0"/>
-          <a:ext cx="0" cy="0"/>
-          <a:chOff x="0" y="0"/>
-          <a:chExt cx="0" cy="0"/>
-        </a:xfrm>
-      </p:grpSpPr>
-      <p:sp>
-        <p:nvSpPr>
-          <p:cNvPr id="95" name="Google Shape;95;p20"/>
-          <p:cNvSpPr txBox="1"/>
-          <p:nvPr>
-            <p:ph type="title"/>
-          </p:nvPr>
-        </p:nvSpPr>
-        <p:spPr>
-          <a:xfrm>
-            <a:off x="671250" y="2141250"/>
-            <a:ext cx="7852200" cy="861000"/>
-          </a:xfrm>
-          <a:prstGeom prst="rect">
-            <a:avLst/>
-          </a:prstGeom>
-        </p:spPr>
-        <p:txBody>
-          <a:bodyPr anchorCtr="0" anchor="ctr" bIns="91425" lIns="91425" spcFirstLastPara="1" rIns="91425" wrap="square" tIns="91425">
-            <a:noAutofit/>
-          </a:bodyPr>
-          <a:lstStyle/>
-          <a:p>
-            <a:pPr indent="0" lvl="0" marL="0" rtl="0" algn="ctr">
-              <a:spcBef>
-                <a:spcPts val="0"/>
-              </a:spcBef>
-              <a:spcAft>
-                <a:spcPts val="0"/>
-              </a:spcAft>
-              <a:buNone/>
-            </a:pPr>
-            <a:r>
-              <a:rPr lang="en"/>
-              <a:t>Getting everyone a Linux box</a:t>
-            </a:r>
-            <a:endParaRPr/>
+            <a:endParaRPr sz="2400">
+              <a:solidFill>
+                <a:schemeClr val="dk2"/>
+              </a:solidFill>
+              <a:latin typeface="Oswald"/>
+              <a:ea typeface="Oswald"/>
+              <a:cs typeface="Oswald"/>
+              <a:sym typeface="Oswald"/>
+            </a:endParaRPr>
           </a:p>
         </p:txBody>
       </p:sp>
@@ -7853,7 +9494,7 @@
   <p:cSld>
     <p:spTree>
       <p:nvGrpSpPr>
-        <p:cNvPr id="99" name="Shape 99"/>
+        <p:cNvPr id="106" name="Shape 106"/>
         <p:cNvGrpSpPr/>
         <p:nvPr/>
       </p:nvGrpSpPr>
@@ -7867,7 +9508,7 @@
       </p:grpSpPr>
       <p:sp>
         <p:nvSpPr>
-          <p:cNvPr id="100" name="Google Shape;100;p21"/>
+          <p:cNvPr id="107" name="Google Shape;107;p21"/>
           <p:cNvSpPr txBox="1"/>
           <p:nvPr>
             <p:ph type="title"/>
@@ -7875,7 +9516,7 @@
         </p:nvSpPr>
         <p:spPr>
           <a:xfrm>
-            <a:off x="311700" y="445025"/>
+            <a:off x="311700" y="483625"/>
             <a:ext cx="8520600" cy="572700"/>
           </a:xfrm>
           <a:prstGeom prst="rect">
@@ -7899,7 +9540,7 @@
             </a:pPr>
             <a:r>
               <a:rPr lang="en"/>
-              <a:t>Getting everyone a Linux Box- two ways to fix this</a:t>
+              <a:t>Obtain Dependencies</a:t>
             </a:r>
             <a:endParaRPr/>
           </a:p>
@@ -7907,7 +9548,7 @@
       </p:sp>
       <p:sp>
         <p:nvSpPr>
-          <p:cNvPr id="101" name="Google Shape;101;p21"/>
+          <p:cNvPr id="108" name="Google Shape;108;p21"/>
           <p:cNvSpPr txBox="1"/>
           <p:nvPr>
             <p:ph idx="1" type="body"/>
@@ -7928,19 +9569,195 @@
           </a:bodyPr>
           <a:lstStyle/>
           <a:p>
-            <a:pPr indent="-342900" lvl="0" marL="457200" rtl="0" algn="l">
-              <a:spcBef>
-                <a:spcPts val="0"/>
-              </a:spcBef>
-              <a:spcAft>
-                <a:spcPts val="0"/>
-              </a:spcAft>
-              <a:buSzPts val="1800"/>
-              <a:buAutoNum type="arabicPeriod"/>
+            <a:pPr indent="0" lvl="0" marL="0" rtl="0" algn="l">
+              <a:lnSpc>
+                <a:spcPct val="150000"/>
+              </a:lnSpc>
+              <a:spcBef>
+                <a:spcPts val="0"/>
+              </a:spcBef>
+              <a:spcAft>
+                <a:spcPts val="0"/>
+              </a:spcAft>
+              <a:buNone/>
             </a:pPr>
             <a:r>
-              <a:rPr lang="en"/>
-              <a:t>InstallFest- </a:t>
+              <a:rPr lang="en" sz="2400">
+                <a:solidFill>
+                  <a:schemeClr val="dk2"/>
+                </a:solidFill>
+                <a:latin typeface="Consolas"/>
+                <a:ea typeface="Consolas"/>
+                <a:cs typeface="Consolas"/>
+                <a:sym typeface="Consolas"/>
+              </a:rPr>
+              <a:t>$ sudo apt update</a:t>
+            </a:r>
+            <a:endParaRPr sz="2400">
+              <a:solidFill>
+                <a:schemeClr val="dk2"/>
+              </a:solidFill>
+              <a:latin typeface="Consolas"/>
+              <a:ea typeface="Consolas"/>
+              <a:cs typeface="Consolas"/>
+              <a:sym typeface="Consolas"/>
+            </a:endParaRPr>
+          </a:p>
+          <a:p>
+            <a:pPr indent="0" lvl="0" marL="0" rtl="0" algn="l">
+              <a:lnSpc>
+                <a:spcPct val="150000"/>
+              </a:lnSpc>
+              <a:spcBef>
+                <a:spcPts val="0"/>
+              </a:spcBef>
+              <a:spcAft>
+                <a:spcPts val="0"/>
+              </a:spcAft>
+              <a:buNone/>
+            </a:pPr>
+            <a:r>
+              <a:rPr lang="en" sz="2400">
+                <a:solidFill>
+                  <a:schemeClr val="dk2"/>
+                </a:solidFill>
+                <a:latin typeface="Consolas"/>
+                <a:ea typeface="Consolas"/>
+                <a:cs typeface="Consolas"/>
+                <a:sym typeface="Consolas"/>
+              </a:rPr>
+              <a:t>$ sudo apt install virtualbox \</a:t>
+            </a:r>
+            <a:endParaRPr sz="2400">
+              <a:solidFill>
+                <a:schemeClr val="dk2"/>
+              </a:solidFill>
+              <a:latin typeface="Consolas"/>
+              <a:ea typeface="Consolas"/>
+              <a:cs typeface="Consolas"/>
+              <a:sym typeface="Consolas"/>
+            </a:endParaRPr>
+          </a:p>
+          <a:p>
+            <a:pPr indent="0" lvl="0" marL="0" rtl="0" algn="l">
+              <a:lnSpc>
+                <a:spcPct val="150000"/>
+              </a:lnSpc>
+              <a:spcBef>
+                <a:spcPts val="0"/>
+              </a:spcBef>
+              <a:spcAft>
+                <a:spcPts val="0"/>
+              </a:spcAft>
+              <a:buNone/>
+            </a:pPr>
+            <a:r>
+              <a:rPr lang="en" sz="2400">
+                <a:solidFill>
+                  <a:schemeClr val="dk2"/>
+                </a:solidFill>
+                <a:latin typeface="Consolas"/>
+                <a:ea typeface="Consolas"/>
+                <a:cs typeface="Consolas"/>
+                <a:sym typeface="Consolas"/>
+              </a:rPr>
+              <a:t>  virtualbox-guest-additions-iso</a:t>
+            </a:r>
+            <a:endParaRPr sz="2400">
+              <a:solidFill>
+                <a:schemeClr val="dk2"/>
+              </a:solidFill>
+              <a:latin typeface="Consolas"/>
+              <a:ea typeface="Consolas"/>
+              <a:cs typeface="Consolas"/>
+              <a:sym typeface="Consolas"/>
+            </a:endParaRPr>
+          </a:p>
+          <a:p>
+            <a:pPr indent="0" lvl="0" marL="0" rtl="0" algn="l">
+              <a:lnSpc>
+                <a:spcPct val="150000"/>
+              </a:lnSpc>
+              <a:spcBef>
+                <a:spcPts val="0"/>
+              </a:spcBef>
+              <a:spcAft>
+                <a:spcPts val="0"/>
+              </a:spcAft>
+              <a:buNone/>
+            </a:pPr>
+            <a:r>
+              <a:rPr lang="en" sz="2400">
+                <a:solidFill>
+                  <a:schemeClr val="dk2"/>
+                </a:solidFill>
+                <a:latin typeface="Consolas"/>
+                <a:ea typeface="Consolas"/>
+                <a:cs typeface="Consolas"/>
+                <a:sym typeface="Consolas"/>
+              </a:rPr>
+              <a:t>$ sudo apt install xorg</a:t>
+            </a:r>
+            <a:endParaRPr sz="2400">
+              <a:solidFill>
+                <a:schemeClr val="dk2"/>
+              </a:solidFill>
+              <a:latin typeface="Consolas"/>
+              <a:ea typeface="Consolas"/>
+              <a:cs typeface="Consolas"/>
+              <a:sym typeface="Consolas"/>
+            </a:endParaRPr>
+          </a:p>
+          <a:p>
+            <a:pPr indent="0" lvl="0" marL="0" rtl="0" algn="l">
+              <a:lnSpc>
+                <a:spcPct val="150000"/>
+              </a:lnSpc>
+              <a:spcBef>
+                <a:spcPts val="0"/>
+              </a:spcBef>
+              <a:spcAft>
+                <a:spcPts val="0"/>
+              </a:spcAft>
+              <a:buNone/>
+            </a:pPr>
+            <a:r>
+              <a:rPr lang="en" sz="2400">
+                <a:solidFill>
+                  <a:schemeClr val="dk2"/>
+                </a:solidFill>
+                <a:latin typeface="Consolas"/>
+                <a:ea typeface="Consolas"/>
+                <a:cs typeface="Consolas"/>
+                <a:sym typeface="Consolas"/>
+              </a:rPr>
+              <a:t>$ sudo apt install nginx</a:t>
+            </a:r>
+            <a:endParaRPr sz="2400">
+              <a:solidFill>
+                <a:schemeClr val="dk2"/>
+              </a:solidFill>
+              <a:latin typeface="Consolas"/>
+              <a:ea typeface="Consolas"/>
+              <a:cs typeface="Consolas"/>
+              <a:sym typeface="Consolas"/>
+            </a:endParaRPr>
+          </a:p>
+          <a:p>
+            <a:pPr indent="0" lvl="0" marL="0" rtl="0" algn="l">
+              <a:lnSpc>
+                <a:spcPct val="150000"/>
+              </a:lnSpc>
+              <a:spcBef>
+                <a:spcPts val="0"/>
+              </a:spcBef>
+              <a:spcAft>
+                <a:spcPts val="1600"/>
+              </a:spcAft>
+              <a:buNone/>
+            </a:pPr>
+            <a:r>
+              <a:t/>
             </a:r>
             <a:endParaRPr/>
           </a:p>
@@ -7955,6 +9772,285 @@
 </file>
 
 <file path=ppt/theme/theme1.xml><?xml version="1.0" encoding="utf-8"?>
+<a:theme xmlns:a="http://schemas.openxmlformats.org/drawingml/2006/main" xmlns:r="http://schemas.openxmlformats.org/officeDocument/2006/relationships" name="Slate">
+  <a:themeElements>
+    <a:clrScheme name="Slate">
+      <a:dk1>
+        <a:srgbClr val="FFFFFF"/>
+      </a:dk1>
+      <a:lt1>
+        <a:srgbClr val="37474F"/>
+      </a:lt1>
+      <a:dk2>
+        <a:srgbClr val="9E9E9E"/>
+      </a:dk2>
+      <a:lt2>
+        <a:srgbClr val="E0E0E0"/>
+      </a:lt2>
+      <a:accent1>
+        <a:srgbClr val="616161"/>
+      </a:accent1>
+      <a:accent2>
+        <a:srgbClr val="78909C"/>
+      </a:accent2>
+      <a:accent3>
+        <a:srgbClr val="CACACA"/>
+      </a:accent3>
+      <a:accent4>
+        <a:srgbClr val="64FFDA"/>
+      </a:accent4>
+      <a:accent5>
+        <a:srgbClr val="FFD966"/>
+      </a:accent5>
+      <a:accent6>
+        <a:srgbClr val="F5F5F5"/>
+      </a:accent6>
+      <a:hlink>
+        <a:srgbClr val="FFD966"/>
+      </a:hlink>
+      <a:folHlink>
+        <a:srgbClr val="FFD966"/>
+      </a:folHlink>
+    </a:clrScheme>
+    <a:fontScheme name="Office">
+      <a:majorFont>
+        <a:latin typeface="Arial"/>
+        <a:ea typeface=""/>
+        <a:cs typeface=""/>
+        <a:font script="Jpan" typeface="ＭＳ Ｐゴシック"/>
+        <a:font script="Hang" typeface="맑은 고딕"/>
+        <a:font script="Hans" typeface="宋体"/>
+        <a:font script="Hant" typeface="新細明體"/>
+        <a:font script="Arab" typeface="Times New Roman"/>
+        <a:font script="Hebr" typeface="Times New Roman"/>
+        <a:font script="Thai" typeface="Angsana New"/>
+        <a:font script="Ethi" typeface="Nyala"/>
+        <a:font script="Beng" typeface="Vrinda"/>
+        <a:font script="Gujr" typeface="Shruti"/>
+        <a:font script="Khmr" typeface="MoolBoran"/>
+        <a:font script="Knda" typeface="Tunga"/>
+        <a:font script="Guru" typeface="Raavi"/>
+        <a:font script="Cans" typeface="Euphemia"/>
+        <a:font script="Cher" typeface="Plantagenet Cherokee"/>
+        <a:font script="Yiii" typeface="Microsoft Yi Baiti"/>
+        <a:font script="Tibt" typeface="Microsoft Himalaya"/>
+        <a:font script="Thaa" typeface="MV Boli"/>
+        <a:font script="Deva" typeface="Mangal"/>
+        <a:font script="Telu" typeface="Gautami"/>
+        <a:font script="Taml" typeface="Latha"/>
+        <a:font script="Syrc" typeface="Estrangelo Edessa"/>
+        <a:font script="Orya" typeface="Kalinga"/>
+        <a:font script="Mlym" typeface="Kartika"/>
+        <a:font script="Laoo" typeface="DokChampa"/>
+        <a:font script="Sinh" typeface="Iskoola Pota"/>
+        <a:font script="Mong" typeface="Mongolian Baiti"/>
+        <a:font script="Viet" typeface="Times New Roman"/>
+        <a:font script="Uigh" typeface="Microsoft Uighur"/>
+        <a:font script="Geor" typeface="Sylfaen"/>
+      </a:majorFont>
+      <a:minorFont>
+        <a:latin typeface="Arial"/>
+        <a:ea typeface=""/>
+        <a:cs typeface=""/>
+        <a:font script="Jpan" typeface="ＭＳ Ｐゴシック"/>
+        <a:font script="Hang" typeface="맑은 고딕"/>
+        <a:font script="Hans" typeface="宋体"/>
+        <a:font script="Hant" typeface="新細明體"/>
+        <a:font script="Arab" typeface="Arial"/>
+        <a:font script="Hebr" typeface="Arial"/>
+        <a:font script="Thai" typeface="Cordia New"/>
+        <a:font script="Ethi" typeface="Nyala"/>
+        <a:font script="Beng" typeface="Vrinda"/>
+        <a:font script="Gujr" typeface="Shruti"/>
+        <a:font script="Khmr" typeface="DaunPenh"/>
+        <a:font script="Knda" typeface="Tunga"/>
+        <a:font script="Guru" typeface="Raavi"/>
+        <a:font script="Cans" typeface="Euphemia"/>
+        <a:font script="Cher" typeface="Plantagenet Cherokee"/>
+        <a:font script="Yiii" typeface="Microsoft Yi Baiti"/>
+        <a:font script="Tibt" typeface="Microsoft Himalaya"/>
+        <a:font script="Thaa" typeface="MV Boli"/>
+        <a:font script="Deva" typeface="Mangal"/>
+        <a:font script="Telu" typeface="Gautami"/>
+        <a:font script="Taml" typeface="Latha"/>
+        <a:font script="Syrc" typeface="Estrangelo Edessa"/>
+        <a:font script="Orya" typeface="Kalinga"/>
+        <a:font script="Mlym" typeface="Kartika"/>
+        <a:font script="Laoo" typeface="DokChampa"/>
+        <a:font script="Sinh" typeface="Iskoola Pota"/>
+        <a:font script="Mong" typeface="Mongolian Baiti"/>
+        <a:font script="Viet" typeface="Arial"/>
+        <a:font script="Uigh" typeface="Microsoft Uighur"/>
+        <a:font script="Geor" typeface="Sylfaen"/>
+      </a:minorFont>
+    </a:fontScheme>
+    <a:fmtScheme name="Office">
+      <a:fillStyleLst>
+        <a:solidFill>
+          <a:schemeClr val="phClr"/>
+        </a:solidFill>
+        <a:gradFill rotWithShape="1">
+          <a:gsLst>
+            <a:gs pos="0">
+              <a:schemeClr val="phClr">
+                <a:tint val="50000"/>
+                <a:satMod val="300000"/>
+              </a:schemeClr>
+            </a:gs>
+            <a:gs pos="35000">
+              <a:schemeClr val="phClr">
+                <a:tint val="37000"/>
+                <a:satMod val="300000"/>
+              </a:schemeClr>
+            </a:gs>
+            <a:gs pos="100000">
+              <a:schemeClr val="phClr">
+                <a:tint val="15000"/>
+                <a:satMod val="350000"/>
+              </a:schemeClr>
+            </a:gs>
+          </a:gsLst>
+          <a:lin ang="16200000" scaled="1"/>
+        </a:gradFill>
+        <a:gradFill rotWithShape="1">
+          <a:gsLst>
+            <a:gs pos="0">
+              <a:schemeClr val="phClr">
+                <a:tint val="100000"/>
+                <a:shade val="100000"/>
+                <a:satMod val="130000"/>
+              </a:schemeClr>
+            </a:gs>
+            <a:gs pos="100000">
+              <a:schemeClr val="phClr">
+                <a:tint val="50000"/>
+                <a:shade val="100000"/>
+                <a:satMod val="350000"/>
+              </a:schemeClr>
+            </a:gs>
+          </a:gsLst>
+          <a:lin ang="16200000" scaled="0"/>
+        </a:gradFill>
+      </a:fillStyleLst>
+      <a:lnStyleLst>
+        <a:ln w="9525" cap="flat" cmpd="sng" algn="ctr">
+          <a:solidFill>
+            <a:schemeClr val="phClr">
+              <a:shade val="95000"/>
+              <a:satMod val="105000"/>
+            </a:schemeClr>
+          </a:solidFill>
+          <a:prstDash val="solid"/>
+        </a:ln>
+        <a:ln w="25400" cap="flat" cmpd="sng" algn="ctr">
+          <a:solidFill>
+            <a:schemeClr val="phClr"/>
+          </a:solidFill>
+          <a:prstDash val="solid"/>
+        </a:ln>
+        <a:ln w="38100" cap="flat" cmpd="sng" algn="ctr">
+          <a:solidFill>
+            <a:schemeClr val="phClr"/>
+          </a:solidFill>
+          <a:prstDash val="solid"/>
+        </a:ln>
+      </a:lnStyleLst>
+      <a:effectStyleLst>
+        <a:effectStyle>
+          <a:effectLst>
+            <a:outerShdw blurRad="40000" dist="20000" dir="5400000" rotWithShape="0">
+              <a:srgbClr val="000000">
+                <a:alpha val="38000"/>
+              </a:srgbClr>
+            </a:outerShdw>
+          </a:effectLst>
+        </a:effectStyle>
+        <a:effectStyle>
+          <a:effectLst>
+            <a:outerShdw blurRad="40000" dist="23000" dir="5400000" rotWithShape="0">
+              <a:srgbClr val="000000">
+                <a:alpha val="35000"/>
+              </a:srgbClr>
+            </a:outerShdw>
+          </a:effectLst>
+        </a:effectStyle>
+        <a:effectStyle>
+          <a:effectLst>
+            <a:outerShdw blurRad="40000" dist="23000" dir="5400000" rotWithShape="0">
+              <a:srgbClr val="000000">
+                <a:alpha val="35000"/>
+              </a:srgbClr>
+            </a:outerShdw>
+          </a:effectLst>
+          <a:scene3d>
+            <a:camera prst="orthographicFront">
+              <a:rot lat="0" lon="0" rev="0"/>
+            </a:camera>
+            <a:lightRig rig="threePt" dir="t">
+              <a:rot lat="0" lon="0" rev="1200000"/>
+            </a:lightRig>
+          </a:scene3d>
+          <a:sp3d>
+            <a:bevelT w="63500" h="25400"/>
+          </a:sp3d>
+        </a:effectStyle>
+      </a:effectStyleLst>
+      <a:bgFillStyleLst>
+        <a:solidFill>
+          <a:schemeClr val="phClr"/>
+        </a:solidFill>
+        <a:gradFill rotWithShape="1">
+          <a:gsLst>
+            <a:gs pos="0">
+              <a:schemeClr val="phClr">
+                <a:tint val="40000"/>
+                <a:satMod val="350000"/>
+              </a:schemeClr>
+            </a:gs>
+            <a:gs pos="40000">
+              <a:schemeClr val="phClr">
+                <a:tint val="45000"/>
+                <a:shade val="99000"/>
+                <a:satMod val="350000"/>
+              </a:schemeClr>
+            </a:gs>
+            <a:gs pos="100000">
+              <a:schemeClr val="phClr">
+                <a:shade val="20000"/>
+                <a:satMod val="255000"/>
+              </a:schemeClr>
+            </a:gs>
+          </a:gsLst>
+          <a:path path="circle">
+            <a:fillToRect l="50000" t="-80000" r="50000" b="180000"/>
+          </a:path>
+        </a:gradFill>
+        <a:gradFill rotWithShape="1">
+          <a:gsLst>
+            <a:gs pos="0">
+              <a:schemeClr val="phClr">
+                <a:tint val="80000"/>
+                <a:satMod val="300000"/>
+              </a:schemeClr>
+            </a:gs>
+            <a:gs pos="100000">
+              <a:schemeClr val="phClr">
+                <a:shade val="30000"/>
+                <a:satMod val="200000"/>
+              </a:schemeClr>
+            </a:gs>
+          </a:gsLst>
+          <a:path path="circle">
+            <a:fillToRect l="50000" t="50000" r="50000" b="50000"/>
+          </a:path>
+        </a:gradFill>
+      </a:bgFillStyleLst>
+    </a:fmtScheme>
+  </a:themeElements>
+</a:theme>
+</file>
+
+<file path=ppt/theme/theme2.xml><?xml version="1.0" encoding="utf-8"?>
 <a:theme xmlns:a="http://schemas.openxmlformats.org/drawingml/2006/main" xmlns:r="http://schemas.openxmlformats.org/officeDocument/2006/relationships">
   <a:themeElements>
     <a:clrScheme name="Default">
@@ -8231,283 +10327,4 @@
     </a:fmtScheme>
   </a:themeElements>
 </a:theme>
-</file>
-
-<file path=ppt/theme/theme2.xml><?xml version="1.0" encoding="utf-8"?>
-<a:theme xmlns:a="http://schemas.openxmlformats.org/drawingml/2006/main" xmlns:r="http://schemas.openxmlformats.org/officeDocument/2006/relationships" name="Slate">
-  <a:themeElements>
-    <a:clrScheme name="Slate">
-      <a:dk1>
-        <a:srgbClr val="FFFFFF"/>
-      </a:dk1>
-      <a:lt1>
-        <a:srgbClr val="37474F"/>
-      </a:lt1>
-      <a:dk2>
-        <a:srgbClr val="9E9E9E"/>
-      </a:dk2>
-      <a:lt2>
-        <a:srgbClr val="E0E0E0"/>
-      </a:lt2>
-      <a:accent1>
-        <a:srgbClr val="616161"/>
-      </a:accent1>
-      <a:accent2>
-        <a:srgbClr val="78909C"/>
-      </a:accent2>
-      <a:accent3>
-        <a:srgbClr val="CACACA"/>
-      </a:accent3>
-      <a:accent4>
-        <a:srgbClr val="64FFDA"/>
-      </a:accent4>
-      <a:accent5>
-        <a:srgbClr val="FFD966"/>
-      </a:accent5>
-      <a:accent6>
-        <a:srgbClr val="F5F5F5"/>
-      </a:accent6>
-      <a:hlink>
-        <a:srgbClr val="FFD966"/>
-      </a:hlink>
-      <a:folHlink>
-        <a:srgbClr val="FFD966"/>
-      </a:folHlink>
-    </a:clrScheme>
-    <a:fontScheme name="Office">
-      <a:majorFont>
-        <a:latin typeface="Arial"/>
-        <a:ea typeface=""/>
-        <a:cs typeface=""/>
-        <a:font script="Jpan" typeface="ＭＳ Ｐゴシック"/>
-        <a:font script="Hang" typeface="맑은 고딕"/>
-        <a:font script="Hans" typeface="宋体"/>
-        <a:font script="Hant" typeface="新細明體"/>
-        <a:font script="Arab" typeface="Times New Roman"/>
-        <a:font script="Hebr" typeface="Times New Roman"/>
-        <a:font script="Thai" typeface="Angsana New"/>
-        <a:font script="Ethi" typeface="Nyala"/>
-        <a:font script="Beng" typeface="Vrinda"/>
-        <a:font script="Gujr" typeface="Shruti"/>
-        <a:font script="Khmr" typeface="MoolBoran"/>
-        <a:font script="Knda" typeface="Tunga"/>
-        <a:font script="Guru" typeface="Raavi"/>
-        <a:font script="Cans" typeface="Euphemia"/>
-        <a:font script="Cher" typeface="Plantagenet Cherokee"/>
-        <a:font script="Yiii" typeface="Microsoft Yi Baiti"/>
-        <a:font script="Tibt" typeface="Microsoft Himalaya"/>
-        <a:font script="Thaa" typeface="MV Boli"/>
-        <a:font script="Deva" typeface="Mangal"/>
-        <a:font script="Telu" typeface="Gautami"/>
-        <a:font script="Taml" typeface="Latha"/>
-        <a:font script="Syrc" typeface="Estrangelo Edessa"/>
-        <a:font script="Orya" typeface="Kalinga"/>
-        <a:font script="Mlym" typeface="Kartika"/>
-        <a:font script="Laoo" typeface="DokChampa"/>
-        <a:font script="Sinh" typeface="Iskoola Pota"/>
-        <a:font script="Mong" typeface="Mongolian Baiti"/>
-        <a:font script="Viet" typeface="Times New Roman"/>
-        <a:font script="Uigh" typeface="Microsoft Uighur"/>
-        <a:font script="Geor" typeface="Sylfaen"/>
-      </a:majorFont>
-      <a:minorFont>
-        <a:latin typeface="Arial"/>
-        <a:ea typeface=""/>
-        <a:cs typeface=""/>
-        <a:font script="Jpan" typeface="ＭＳ Ｐゴシック"/>
-        <a:font script="Hang" typeface="맑은 고딕"/>
-        <a:font script="Hans" typeface="宋体"/>
-        <a:font script="Hant" typeface="新細明體"/>
-        <a:font script="Arab" typeface="Arial"/>
-        <a:font script="Hebr" typeface="Arial"/>
-        <a:font script="Thai" typeface="Cordia New"/>
-        <a:font script="Ethi" typeface="Nyala"/>
-        <a:font script="Beng" typeface="Vrinda"/>
-        <a:font script="Gujr" typeface="Shruti"/>
-        <a:font script="Khmr" typeface="DaunPenh"/>
-        <a:font script="Knda" typeface="Tunga"/>
-        <a:font script="Guru" typeface="Raavi"/>
-        <a:font script="Cans" typeface="Euphemia"/>
-        <a:font script="Cher" typeface="Plantagenet Cherokee"/>
-        <a:font script="Yiii" typeface="Microsoft Yi Baiti"/>
-        <a:font script="Tibt" typeface="Microsoft Himalaya"/>
-        <a:font script="Thaa" typeface="MV Boli"/>
-        <a:font script="Deva" typeface="Mangal"/>
-        <a:font script="Telu" typeface="Gautami"/>
-        <a:font script="Taml" typeface="Latha"/>
-        <a:font script="Syrc" typeface="Estrangelo Edessa"/>
-        <a:font script="Orya" typeface="Kalinga"/>
-        <a:font script="Mlym" typeface="Kartika"/>
-        <a:font script="Laoo" typeface="DokChampa"/>
-        <a:font script="Sinh" typeface="Iskoola Pota"/>
-        <a:font script="Mong" typeface="Mongolian Baiti"/>
-        <a:font script="Viet" typeface="Arial"/>
-        <a:font script="Uigh" typeface="Microsoft Uighur"/>
-        <a:font script="Geor" typeface="Sylfaen"/>
-      </a:minorFont>
-    </a:fontScheme>
-    <a:fmtScheme name="Office">
-      <a:fillStyleLst>
-        <a:solidFill>
-          <a:schemeClr val="phClr"/>
-        </a:solidFill>
-        <a:gradFill rotWithShape="1">
-          <a:gsLst>
-            <a:gs pos="0">
-              <a:schemeClr val="phClr">
-                <a:tint val="50000"/>
-                <a:satMod val="300000"/>
-              </a:schemeClr>
-            </a:gs>
-            <a:gs pos="35000">
-              <a:schemeClr val="phClr">
-                <a:tint val="37000"/>
-                <a:satMod val="300000"/>
-              </a:schemeClr>
-            </a:gs>
-            <a:gs pos="100000">
-              <a:schemeClr val="phClr">
-                <a:tint val="15000"/>
-                <a:satMod val="350000"/>
-              </a:schemeClr>
-            </a:gs>
-          </a:gsLst>
-          <a:lin ang="16200000" scaled="1"/>
-        </a:gradFill>
-        <a:gradFill rotWithShape="1">
-          <a:gsLst>
-            <a:gs pos="0">
-              <a:schemeClr val="phClr">
-                <a:tint val="100000"/>
-                <a:shade val="100000"/>
-                <a:satMod val="130000"/>
-              </a:schemeClr>
-            </a:gs>
-            <a:gs pos="100000">
-              <a:schemeClr val="phClr">
-                <a:tint val="50000"/>
-                <a:shade val="100000"/>
-                <a:satMod val="350000"/>
-              </a:schemeClr>
-            </a:gs>
-          </a:gsLst>
-          <a:lin ang="16200000" scaled="0"/>
-        </a:gradFill>
-      </a:fillStyleLst>
-      <a:lnStyleLst>
-        <a:ln w="9525" cap="flat" cmpd="sng" algn="ctr">
-          <a:solidFill>
-            <a:schemeClr val="phClr">
-              <a:shade val="95000"/>
-              <a:satMod val="105000"/>
-            </a:schemeClr>
-          </a:solidFill>
-          <a:prstDash val="solid"/>
-        </a:ln>
-        <a:ln w="25400" cap="flat" cmpd="sng" algn="ctr">
-          <a:solidFill>
-            <a:schemeClr val="phClr"/>
-          </a:solidFill>
-          <a:prstDash val="solid"/>
-        </a:ln>
-        <a:ln w="38100" cap="flat" cmpd="sng" algn="ctr">
-          <a:solidFill>
-            <a:schemeClr val="phClr"/>
-          </a:solidFill>
-          <a:prstDash val="solid"/>
-        </a:ln>
-      </a:lnStyleLst>
-      <a:effectStyleLst>
-        <a:effectStyle>
-          <a:effectLst>
-            <a:outerShdw blurRad="40000" dist="20000" dir="5400000" rotWithShape="0">
-              <a:srgbClr val="000000">
-                <a:alpha val="38000"/>
-              </a:srgbClr>
-            </a:outerShdw>
-          </a:effectLst>
-        </a:effectStyle>
-        <a:effectStyle>
-          <a:effectLst>
-            <a:outerShdw blurRad="40000" dist="23000" dir="5400000" rotWithShape="0">
-              <a:srgbClr val="000000">
-                <a:alpha val="35000"/>
-              </a:srgbClr>
-            </a:outerShdw>
-          </a:effectLst>
-        </a:effectStyle>
-        <a:effectStyle>
-          <a:effectLst>
-            <a:outerShdw blurRad="40000" dist="23000" dir="5400000" rotWithShape="0">
-              <a:srgbClr val="000000">
-                <a:alpha val="35000"/>
-              </a:srgbClr>
-            </a:outerShdw>
-          </a:effectLst>
-          <a:scene3d>
-            <a:camera prst="orthographicFront">
-              <a:rot lat="0" lon="0" rev="0"/>
-            </a:camera>
-            <a:lightRig rig="threePt" dir="t">
-              <a:rot lat="0" lon="0" rev="1200000"/>
-            </a:lightRig>
-          </a:scene3d>
-          <a:sp3d>
-            <a:bevelT w="63500" h="25400"/>
-          </a:sp3d>
-        </a:effectStyle>
-      </a:effectStyleLst>
-      <a:bgFillStyleLst>
-        <a:solidFill>
-          <a:schemeClr val="phClr"/>
-        </a:solidFill>
-        <a:gradFill rotWithShape="1">
-          <a:gsLst>
-            <a:gs pos="0">
-              <a:schemeClr val="phClr">
-                <a:tint val="40000"/>
-                <a:satMod val="350000"/>
-              </a:schemeClr>
-            </a:gs>
-            <a:gs pos="40000">
-              <a:schemeClr val="phClr">
-                <a:tint val="45000"/>
-                <a:shade val="99000"/>
-                <a:satMod val="350000"/>
-              </a:schemeClr>
-            </a:gs>
-            <a:gs pos="100000">
-              <a:schemeClr val="phClr">
-                <a:shade val="20000"/>
-                <a:satMod val="255000"/>
-              </a:schemeClr>
-            </a:gs>
-          </a:gsLst>
-          <a:path path="circle">
-            <a:fillToRect l="50000" t="-80000" r="50000" b="180000"/>
-          </a:path>
-        </a:gradFill>
-        <a:gradFill rotWithShape="1">
-          <a:gsLst>
-            <a:gs pos="0">
-              <a:schemeClr val="phClr">
-                <a:tint val="80000"/>
-                <a:satMod val="300000"/>
-              </a:schemeClr>
-            </a:gs>
-            <a:gs pos="100000">
-              <a:schemeClr val="phClr">
-                <a:shade val="30000"/>
-                <a:satMod val="200000"/>
-              </a:schemeClr>
-            </a:gs>
-          </a:gsLst>
-          <a:path path="circle">
-            <a:fillToRect l="50000" t="50000" r="50000" b="50000"/>
-          </a:path>
-        </a:gradFill>
-      </a:bgFillStyleLst>
-    </a:fmtScheme>
-  </a:themeElements>
-</a:theme>
 </file>
</xml_diff>